<commit_message>
Update slide decks, sample schedule, and pdf version of workshop guide
</commit_message>
<xml_diff>
--- a/presentations/102 - Intro to Spring Boot/Session_4_Advanced_Boot.pptx
+++ b/presentations/102 - Intro to Spring Boot/Session_4_Advanced_Boot.pptx
@@ -238,7 +238,7 @@
           <a:p>
             <a:fld id="{372E5B6B-8713-8747-AE5B-F1241B2BF5F0}" type="datetimeFigureOut">
               <a:rPr lang="en-US" smtClean="0"/>
-              <a:t>10/12/17</a:t>
+              <a:t>10/22/18</a:t>
             </a:fld>
             <a:endParaRPr lang="en-US"/>
           </a:p>
@@ -404,7 +404,7 @@
           <a:p>
             <a:fld id="{7E7B7340-DDD5-1B49-81AA-25BC4050C073}" type="datetimeFigureOut">
               <a:rPr lang="en-US" smtClean="0"/>
-              <a:t>10/12/17</a:t>
+              <a:t>10/22/18</a:t>
             </a:fld>
             <a:endParaRPr lang="en-US"/>
           </a:p>
@@ -468,38 +468,37 @@
           <a:p>
             <a:pPr lvl="0"/>
             <a:r>
-              <a:rPr lang="en-US" smtClean="0"/>
+              <a:rPr lang="en-US"/>
               <a:t>Click to edit Master text styles</a:t>
             </a:r>
           </a:p>
           <a:p>
             <a:pPr lvl="1"/>
             <a:r>
-              <a:rPr lang="en-US" smtClean="0"/>
+              <a:rPr lang="en-US"/>
               <a:t>Second level</a:t>
             </a:r>
           </a:p>
           <a:p>
             <a:pPr lvl="2"/>
             <a:r>
-              <a:rPr lang="en-US" smtClean="0"/>
+              <a:rPr lang="en-US"/>
               <a:t>Third level</a:t>
             </a:r>
           </a:p>
           <a:p>
             <a:pPr lvl="3"/>
             <a:r>
-              <a:rPr lang="en-US" smtClean="0"/>
+              <a:rPr lang="en-US"/>
               <a:t>Fourth level</a:t>
             </a:r>
           </a:p>
           <a:p>
             <a:pPr lvl="4"/>
             <a:r>
-              <a:rPr lang="en-US" smtClean="0"/>
+              <a:rPr lang="en-US"/>
               <a:t>Fifth level</a:t>
             </a:r>
-            <a:endParaRPr lang="en-US"/>
           </a:p>
         </p:txBody>
       </p:sp>
@@ -718,11 +717,11 @@
           <a:lstStyle/>
           <a:p>
             <a:r>
-              <a:rPr lang="en-US" dirty="0" smtClean="0"/>
+              <a:rPr lang="en-US" dirty="0"/>
               <a:t>Resting slide</a:t>
             </a:r>
             <a:r>
-              <a:rPr lang="en-US" baseline="0" dirty="0" smtClean="0"/>
+              <a:rPr lang="en-US" baseline="0" dirty="0"/>
               <a:t> on screen before you begin presenting.</a:t>
             </a:r>
             <a:endParaRPr lang="en-US" dirty="0"/>
@@ -810,28 +809,28 @@
           <a:lstStyle/>
           <a:p>
             <a:r>
-              <a:rPr lang="en-US" dirty="0" smtClean="0"/>
+              <a:rPr lang="en-US" dirty="0"/>
               <a:t>Actuators</a:t>
             </a:r>
             <a:r>
-              <a:rPr lang="en-US" baseline="0" dirty="0" smtClean="0"/>
+              <a:rPr lang="en-US" baseline="0" dirty="0"/>
               <a:t> enable production-ready features to a Spring Boot application – without having to actually implement them yourself</a:t>
             </a:r>
           </a:p>
           <a:p>
-            <a:endParaRPr lang="en-US" baseline="0" dirty="0" smtClean="0"/>
+            <a:endParaRPr lang="en-US" baseline="0" dirty="0"/>
           </a:p>
           <a:p>
             <a:r>
-              <a:rPr lang="en-US" baseline="0" dirty="0" smtClean="0"/>
+              <a:rPr lang="en-US" baseline="0" dirty="0"/>
               <a:t>They’re mainly used to expose different types of information about the running application – health, metrics, info, dump, </a:t>
             </a:r>
             <a:r>
-              <a:rPr lang="en-US" baseline="0" dirty="0" err="1" smtClean="0"/>
+              <a:rPr lang="en-US" baseline="0" dirty="0" err="1"/>
               <a:t>env</a:t>
             </a:r>
             <a:r>
-              <a:rPr lang="en-US" baseline="0" dirty="0" smtClean="0"/>
+              <a:rPr lang="en-US" baseline="0" dirty="0"/>
               <a:t> etc.. And while these are no replacement for production-grade monitoring solution –they’re a very good starting point</a:t>
             </a:r>
             <a:endParaRPr lang="en-US" dirty="0"/>
@@ -923,7 +922,7 @@
               <a:buChar char="•"/>
             </a:pPr>
             <a:r>
-              <a:rPr lang="en-US" dirty="0" smtClean="0"/>
+              <a:rPr lang="en-US" dirty="0"/>
               <a:t>Actuator endpoints allow you to monitor and interact with your application. Spring Boot includes a number of built-in endpoints and you can also add your own. For example the health endpoint provides basic application health information.</a:t>
             </a:r>
           </a:p>
@@ -932,7 +931,7 @@
               <a:buFont typeface="Arial"/>
               <a:buChar char="•"/>
             </a:pPr>
-            <a:endParaRPr lang="en-US" dirty="0" smtClean="0"/>
+            <a:endParaRPr lang="en-US" dirty="0"/>
           </a:p>
           <a:p>
             <a:pPr marL="171450" indent="-171450">
@@ -940,10 +939,9 @@
               <a:buChar char="•"/>
             </a:pPr>
             <a:r>
-              <a:rPr lang="en-US" dirty="0" smtClean="0"/>
-              <a:t>The way that endpoints are exposed will depend on the type of technology that you choose. Most applications choose HTTP monitoring, where the ID of the endpoint is mapped to a URL. For example, by default, the health endpoint will be mapped to /health</a:t>
+              <a:rPr lang="en-US" dirty="0"/>
+              <a:t>The way that endpoints are exposed will depend on the type of technology that you choose. Most applications choose HTTP monitoring, where the ID of the endpoint is mapped to a URL. For example, by default, the health endpoint will be mapped to /actuator/health</a:t>
             </a:r>
-            <a:endParaRPr lang="en-US" dirty="0"/>
           </a:p>
         </p:txBody>
       </p:sp>
@@ -1028,20 +1026,20 @@
           <a:lstStyle/>
           <a:p>
             <a:r>
-              <a:rPr lang="en-US" dirty="0" smtClean="0"/>
+              <a:rPr lang="en-US" dirty="0"/>
               <a:t>Here</a:t>
             </a:r>
             <a:r>
-              <a:rPr lang="en-US" baseline="0" dirty="0" smtClean="0"/>
-              <a:t> we provide the example of the “/health” endpoint as noted in the URL location bar</a:t>
+              <a:rPr lang="en-US" baseline="0" dirty="0"/>
+              <a:t> we provide the example of the “/actuator/health” endpoint as noted in the URL location bar</a:t>
             </a:r>
           </a:p>
           <a:p>
-            <a:endParaRPr lang="en-US" baseline="0" dirty="0" smtClean="0"/>
+            <a:endParaRPr lang="en-US" baseline="0" dirty="0"/>
           </a:p>
           <a:p>
             <a:r>
-              <a:rPr lang="en-US" baseline="0" dirty="0" smtClean="0"/>
+              <a:rPr lang="en-US" baseline="0" dirty="0"/>
               <a:t>There are a number of endpoints exposed by the Actuator, during lab please explore each one</a:t>
             </a:r>
             <a:endParaRPr lang="en-US" dirty="0"/>
@@ -1129,58 +1127,58 @@
           <a:lstStyle/>
           <a:p>
             <a:r>
-              <a:rPr lang="en-US" dirty="0" smtClean="0"/>
+              <a:rPr lang="en-US" dirty="0"/>
               <a:t>Additionally</a:t>
             </a:r>
             <a:r>
-              <a:rPr lang="en-US" baseline="0" dirty="0" smtClean="0"/>
+              <a:rPr lang="en-US" baseline="0" dirty="0"/>
               <a:t> these health indicators, some for backing services, are auto-configured by Spring Boot when appropriate</a:t>
             </a:r>
           </a:p>
           <a:p>
-            <a:endParaRPr lang="en-US" baseline="0" dirty="0" smtClean="0"/>
+            <a:endParaRPr lang="en-US" baseline="0" dirty="0"/>
           </a:p>
           <a:p>
             <a:r>
-              <a:rPr lang="en-US" baseline="0" dirty="0" smtClean="0"/>
+              <a:rPr lang="en-US" baseline="0" dirty="0"/>
               <a:t>Information returned by </a:t>
             </a:r>
             <a:r>
-              <a:rPr lang="en-US" baseline="0" dirty="0" err="1" smtClean="0"/>
+              <a:rPr lang="en-US" baseline="0" dirty="0" err="1"/>
               <a:t>HealthIndicators</a:t>
             </a:r>
             <a:r>
-              <a:rPr lang="en-US" baseline="0" dirty="0" smtClean="0"/>
+              <a:rPr lang="en-US" baseline="0" dirty="0"/>
               <a:t> is often somewhat sensitive in nature. For example, you probably don’t want to publish details of your database server to the world. For this reason, by default, only the health status is exposed over an unauthenticated HTTP connection. If you are happy for complete health information to always be exposed you can set </a:t>
             </a:r>
             <a:r>
-              <a:rPr lang="en-US" baseline="0" dirty="0" err="1" smtClean="0"/>
+              <a:rPr lang="en-US" baseline="0" dirty="0" err="1"/>
               <a:t>endpoints.health.sensitive</a:t>
             </a:r>
             <a:r>
-              <a:rPr lang="en-US" baseline="0" dirty="0" smtClean="0"/>
+              <a:rPr lang="en-US" baseline="0" dirty="0"/>
               <a:t> to false.</a:t>
             </a:r>
           </a:p>
           <a:p>
-            <a:endParaRPr lang="en-US" baseline="0" dirty="0" smtClean="0"/>
+            <a:endParaRPr lang="en-US" baseline="0" dirty="0"/>
           </a:p>
           <a:p>
             <a:r>
-              <a:rPr lang="en-US" baseline="0" dirty="0" smtClean="0"/>
+              <a:rPr lang="en-US" baseline="0" dirty="0"/>
               <a:t>Health responses are also cached to prevent “denial of service” attacks. Use the </a:t>
             </a:r>
             <a:r>
-              <a:rPr lang="en-US" baseline="0" dirty="0" err="1" smtClean="0"/>
+              <a:rPr lang="en-US" baseline="0" dirty="0" err="1"/>
               <a:t>endpoints.health.time</a:t>
             </a:r>
             <a:r>
-              <a:rPr lang="en-US" baseline="0" dirty="0" smtClean="0"/>
+              <a:rPr lang="en-US" baseline="0" dirty="0"/>
               <a:t>-to-live property if you want to change the default cache period of 1000 milliseconds.</a:t>
             </a:r>
           </a:p>
           <a:p>
-            <a:endParaRPr lang="en-US" baseline="0" dirty="0" smtClean="0"/>
+            <a:endParaRPr lang="en-US" baseline="0" dirty="0"/>
           </a:p>
           <a:p>
             <a:endParaRPr lang="en-US" dirty="0"/>
@@ -1272,8 +1270,8 @@
               <a:buChar char="•"/>
             </a:pPr>
             <a:r>
-              <a:rPr lang="en-US" dirty="0" smtClean="0"/>
-              <a:t>The management endpoints are secure even if the application endpoints are insecure.</a:t>
+              <a:rPr lang="en-US" dirty="0"/>
+              <a:t>The management endpoints are not exposed by default save for info, health </a:t>
             </a:r>
           </a:p>
           <a:p>
@@ -1282,24 +1280,16 @@
               <a:buChar char="•"/>
             </a:pPr>
             <a:r>
-              <a:rPr lang="en-US" dirty="0" smtClean="0"/>
-              <a:t>Security events are transformed into </a:t>
+              <a:rPr lang="en-US" dirty="0"/>
+              <a:t>If security-starter on </a:t>
             </a:r>
             <a:r>
-              <a:rPr lang="en-US" dirty="0" err="1" smtClean="0"/>
-              <a:t>AuditEvents</a:t>
+              <a:rPr lang="en-US" dirty="0" err="1"/>
+              <a:t>classpath</a:t>
             </a:r>
             <a:r>
-              <a:rPr lang="en-US" dirty="0" smtClean="0"/>
-              <a:t> and published to the </a:t>
-            </a:r>
-            <a:r>
-              <a:rPr lang="en-US" dirty="0" err="1" smtClean="0"/>
-              <a:t>AuditService</a:t>
-            </a:r>
-            <a:r>
-              <a:rPr lang="en-US" dirty="0" smtClean="0"/>
-              <a:t>.</a:t>
+              <a:rPr lang="en-US" dirty="0"/>
+              <a:t>, you may specify role that is authorized to execute request(s)</a:t>
             </a:r>
           </a:p>
           <a:p>
@@ -1308,10 +1298,25 @@
               <a:buChar char="•"/>
             </a:pPr>
             <a:r>
-              <a:rPr lang="en-US" dirty="0" smtClean="0"/>
-              <a:t>The default user will have the ADMIN role as well as the USER role.</a:t>
+              <a:rPr lang="en-US" dirty="0"/>
+              <a:t>Security events are transformed into </a:t>
             </a:r>
-            <a:endParaRPr lang="en-US" dirty="0"/>
+            <a:r>
+              <a:rPr lang="en-US" dirty="0" err="1"/>
+              <a:t>AuditEvents</a:t>
+            </a:r>
+            <a:r>
+              <a:rPr lang="en-US" dirty="0"/>
+              <a:t> and published to the </a:t>
+            </a:r>
+            <a:r>
+              <a:rPr lang="en-US" dirty="0" err="1"/>
+              <a:t>AuditService</a:t>
+            </a:r>
+            <a:r>
+              <a:rPr lang="en-US" dirty="0"/>
+              <a:t>.</a:t>
+            </a:r>
           </a:p>
         </p:txBody>
       </p:sp>
@@ -1400,24 +1405,32 @@
               <a:buChar char="•"/>
             </a:pPr>
             <a:r>
-              <a:rPr lang="en-US" sz="1200" dirty="0" smtClean="0"/>
-              <a:t>A ‘gauge’ records a single value; and a ‘counter’ records a delta (an increment or decrement). Spring Boot Actuator also provides a </a:t>
+              <a:rPr lang="en-US" sz="1200" b="0" i="0" u="none" strike="noStrike" kern="1200" dirty="0">
+                <a:solidFill>
+                  <a:schemeClr val="tx1"/>
+                </a:solidFill>
+                <a:effectLst/>
+                <a:latin typeface="+mn-lt"/>
+                <a:ea typeface="+mn-ea"/>
+                <a:cs typeface="+mn-cs"/>
+              </a:rPr>
+              <a:t>Micrometer packs with a </a:t>
             </a:r>
             <a:r>
-              <a:rPr lang="en-US" sz="1200" dirty="0" err="1" smtClean="0"/>
-              <a:t>PublicMetrics</a:t>
+              <a:rPr lang="en-US" dirty="0" err="1"/>
+              <a:t>SimpleMeterRegistry</a:t>
             </a:r>
             <a:r>
-              <a:rPr lang="en-US" sz="1200" dirty="0" smtClean="0"/>
-              <a:t> interface that you can implement to expose metrics that you cannot record via one of those two mechanisms. Look at </a:t>
-            </a:r>
-            <a:r>
-              <a:rPr lang="en-US" sz="1200" dirty="0" err="1" smtClean="0"/>
-              <a:t>SystemPublicMetrics</a:t>
-            </a:r>
-            <a:r>
-              <a:rPr lang="en-US" sz="1200" dirty="0" smtClean="0"/>
-              <a:t> for an example.</a:t>
+              <a:rPr lang="en-US" sz="1200" b="0" i="0" u="none" strike="noStrike" kern="1200" dirty="0">
+                <a:solidFill>
+                  <a:schemeClr val="tx1"/>
+                </a:solidFill>
+                <a:effectLst/>
+                <a:latin typeface="+mn-lt"/>
+                <a:ea typeface="+mn-ea"/>
+                <a:cs typeface="+mn-cs"/>
+              </a:rPr>
+              <a:t> that holds the latest value of each meter in memory and doesn’t export the data anywhere. If you don’t yet have a preferred monitoring system, you can get started playing with metrics by using the simple registry</a:t>
             </a:r>
           </a:p>
           <a:p>
@@ -1425,17 +1438,21 @@
               <a:buFont typeface="Arial"/>
               <a:buChar char="•"/>
             </a:pPr>
-            <a:endParaRPr lang="en-US" sz="1200" dirty="0" smtClean="0"/>
+            <a:endParaRPr lang="en-US" sz="1200" b="0" i="0" u="none" strike="noStrike" kern="1200" dirty="0">
+              <a:solidFill>
+                <a:schemeClr val="tx1"/>
+              </a:solidFill>
+              <a:effectLst/>
+              <a:latin typeface="+mn-lt"/>
+              <a:ea typeface="+mn-ea"/>
+              <a:cs typeface="+mn-cs"/>
+            </a:endParaRPr>
           </a:p>
           <a:p>
             <a:pPr marL="171450" indent="-171450">
               <a:buFont typeface="Arial"/>
               <a:buChar char="•"/>
             </a:pPr>
-            <a:r>
-              <a:rPr lang="en-US" sz="1200" dirty="0" smtClean="0"/>
-              <a:t>Metrics for all HTTP requests are automatically recorded, so if you hit the metrics endpoint you should see a response similar to this:</a:t>
-            </a:r>
             <a:endParaRPr lang="en-US" dirty="0"/>
           </a:p>
         </p:txBody>
@@ -1521,53 +1538,53 @@
           <a:lstStyle/>
           <a:p>
             <a:r>
-              <a:rPr lang="en-US" dirty="0" smtClean="0"/>
+              <a:rPr lang="en-US" dirty="0"/>
               <a:t>If one wants to set the active Spring</a:t>
             </a:r>
             <a:r>
-              <a:rPr lang="en-US" baseline="0" dirty="0" smtClean="0"/>
+              <a:rPr lang="en-US" baseline="0" dirty="0"/>
               <a:t> profiles</a:t>
             </a:r>
           </a:p>
           <a:p>
-            <a:endParaRPr lang="en-US" baseline="0" dirty="0" smtClean="0"/>
+            <a:endParaRPr lang="en-US" baseline="0" dirty="0"/>
           </a:p>
           <a:p>
             <a:r>
-              <a:rPr lang="en-US" baseline="0" dirty="0" smtClean="0"/>
+              <a:rPr lang="en-US" baseline="0" dirty="0"/>
               <a:t>The Spring Environment has an API for this, but normally one would set either a </a:t>
             </a:r>
             <a:r>
-              <a:rPr lang="en-US" baseline="0" dirty="0" err="1" smtClean="0"/>
+              <a:rPr lang="en-US" baseline="0" dirty="0" err="1"/>
               <a:t>System.property</a:t>
             </a:r>
             <a:r>
-              <a:rPr lang="en-US" baseline="0" dirty="0" smtClean="0"/>
+              <a:rPr lang="en-US" baseline="0" dirty="0"/>
               <a:t>, or an OS environment variable or it can be set in the </a:t>
             </a:r>
             <a:r>
-              <a:rPr lang="en-US" baseline="0" dirty="0" err="1" smtClean="0"/>
+              <a:rPr lang="en-US" baseline="0" dirty="0" err="1"/>
               <a:t>application.properties</a:t>
             </a:r>
             <a:r>
-              <a:rPr lang="en-US" baseline="0" dirty="0" smtClean="0"/>
+              <a:rPr lang="en-US" baseline="0" dirty="0"/>
               <a:t> (or </a:t>
             </a:r>
             <a:r>
-              <a:rPr lang="en-US" baseline="0" dirty="0" err="1" smtClean="0"/>
+              <a:rPr lang="en-US" baseline="0" dirty="0" err="1"/>
               <a:t>application.yml</a:t>
             </a:r>
             <a:r>
-              <a:rPr lang="en-US" baseline="0" dirty="0" smtClean="0"/>
+              <a:rPr lang="en-US" baseline="0" dirty="0"/>
               <a:t>) file</a:t>
             </a:r>
           </a:p>
           <a:p>
-            <a:endParaRPr lang="en-US" baseline="0" dirty="0" smtClean="0"/>
+            <a:endParaRPr lang="en-US" baseline="0" dirty="0"/>
           </a:p>
           <a:p>
             <a:r>
-              <a:rPr lang="en-US" baseline="0" dirty="0" smtClean="0"/>
+              <a:rPr lang="en-US" baseline="0" dirty="0"/>
               <a:t>The YAML documents are merged in the order they are encountered (so later values override earlier ones)</a:t>
             </a:r>
           </a:p>
@@ -2541,10 +2558,9 @@
           </a:lstStyle>
           <a:p>
             <a:r>
-              <a:rPr lang="en-US" dirty="0" smtClean="0"/>
+              <a:rPr lang="en-US" dirty="0"/>
               <a:t>CLICK TO EDIT MASTER TITLE STYLE</a:t>
             </a:r>
-            <a:endParaRPr lang="en-US" dirty="0"/>
           </a:p>
         </p:txBody>
       </p:sp>
@@ -2619,35 +2635,35 @@
           <a:p>
             <a:pPr lvl="0"/>
             <a:r>
-              <a:rPr lang="en-US" smtClean="0"/>
+              <a:rPr lang="en-US"/>
               <a:t>Click to edit Master text styles</a:t>
             </a:r>
           </a:p>
           <a:p>
             <a:pPr lvl="1"/>
             <a:r>
-              <a:rPr lang="en-US" smtClean="0"/>
+              <a:rPr lang="en-US"/>
               <a:t>Second level</a:t>
             </a:r>
           </a:p>
           <a:p>
             <a:pPr lvl="2"/>
             <a:r>
-              <a:rPr lang="en-US" smtClean="0"/>
+              <a:rPr lang="en-US"/>
               <a:t>Third level</a:t>
             </a:r>
           </a:p>
           <a:p>
             <a:pPr lvl="3"/>
             <a:r>
-              <a:rPr lang="en-US" smtClean="0"/>
+              <a:rPr lang="en-US"/>
               <a:t>Fourth level</a:t>
             </a:r>
           </a:p>
           <a:p>
             <a:pPr lvl="4"/>
             <a:r>
-              <a:rPr lang="en-US" smtClean="0"/>
+              <a:rPr lang="en-US"/>
               <a:t>Fifth level</a:t>
             </a:r>
             <a:endParaRPr lang="en-US" dirty="0"/>
@@ -2726,7 +2742,7 @@
           <a:p>
             <a:pPr algn="l"/>
             <a:r>
-              <a:rPr lang="en-US" sz="600" dirty="0" smtClean="0">
+              <a:rPr lang="en-US" sz="600" dirty="0">
                 <a:solidFill>
                   <a:schemeClr val="bg1">
                     <a:lumMod val="50000"/>
@@ -2738,7 +2754,7 @@
               <a:t>© Copyright 2015 Pivotal.</a:t>
             </a:r>
             <a:r>
-              <a:rPr lang="en-US" sz="600" baseline="0" dirty="0" smtClean="0">
+              <a:rPr lang="en-US" sz="600" baseline="0" dirty="0">
                 <a:solidFill>
                   <a:schemeClr val="bg1">
                     <a:lumMod val="50000"/>
@@ -2750,7 +2766,7 @@
               <a:t> </a:t>
             </a:r>
             <a:r>
-              <a:rPr lang="en-US" sz="600" dirty="0" smtClean="0">
+              <a:rPr lang="en-US" sz="600" dirty="0">
                 <a:solidFill>
                   <a:schemeClr val="bg1">
                     <a:lumMod val="50000"/>
@@ -2761,15 +2777,6 @@
               </a:rPr>
               <a:t>All rights reserved.</a:t>
             </a:r>
-            <a:endParaRPr lang="en-US" sz="600" dirty="0">
-              <a:solidFill>
-                <a:schemeClr val="bg1">
-                  <a:lumMod val="50000"/>
-                </a:schemeClr>
-              </a:solidFill>
-              <a:latin typeface="Arial"/>
-              <a:cs typeface="Arial"/>
-            </a:endParaRPr>
           </a:p>
         </p:txBody>
       </p:sp>
@@ -2842,13 +2849,6 @@
   <p:clrMapOvr>
     <a:masterClrMapping/>
   </p:clrMapOvr>
-  <p:timing>
-    <p:tnLst>
-      <p:par>
-        <p:cTn id="1" dur="indefinite" restart="never" nodeType="tmRoot"/>
-      </p:par>
-    </p:tnLst>
-  </p:timing>
 </p:sldLayout>
 </file>
 
@@ -3204,10 +3204,9 @@
           </a:lstStyle>
           <a:p>
             <a:r>
-              <a:rPr lang="en-US" dirty="0" smtClean="0"/>
+              <a:rPr lang="en-US" dirty="0"/>
               <a:t>Click to edit Master title style</a:t>
             </a:r>
-            <a:endParaRPr lang="en-US" dirty="0"/>
           </a:p>
         </p:txBody>
       </p:sp>
@@ -3303,10 +3302,9 @@
           <a:p>
             <a:pPr lvl="0"/>
             <a:r>
-              <a:rPr lang="en-US" dirty="0" smtClean="0"/>
+              <a:rPr lang="en-US" dirty="0"/>
               <a:t>Click to edit Master</a:t>
             </a:r>
-            <a:endParaRPr lang="en-US" dirty="0"/>
           </a:p>
         </p:txBody>
       </p:sp>
@@ -3370,13 +3368,6 @@
   <p:clrMapOvr>
     <a:masterClrMapping/>
   </p:clrMapOvr>
-  <p:timing>
-    <p:tnLst>
-      <p:par>
-        <p:cTn id="1" dur="indefinite" restart="never" nodeType="tmRoot"/>
-      </p:par>
-    </p:tnLst>
-  </p:timing>
 </p:sldLayout>
 </file>
 
@@ -3548,13 +3539,6 @@
   <p:clrMapOvr>
     <a:masterClrMapping/>
   </p:clrMapOvr>
-  <p:timing>
-    <p:tnLst>
-      <p:par>
-        <p:cTn id="1" dur="indefinite" restart="never" nodeType="tmRoot"/>
-      </p:par>
-    </p:tnLst>
-  </p:timing>
 </p:sldLayout>
 </file>
 
@@ -3641,13 +3625,6 @@
   <p:clrMapOvr>
     <a:masterClrMapping/>
   </p:clrMapOvr>
-  <p:timing>
-    <p:tnLst>
-      <p:par>
-        <p:cTn id="1" dur="indefinite" restart="never" nodeType="tmRoot"/>
-      </p:par>
-    </p:tnLst>
-  </p:timing>
 </p:sldLayout>
 </file>
 
@@ -3706,10 +3683,9 @@
           </a:lstStyle>
           <a:p>
             <a:r>
-              <a:rPr lang="en-US" dirty="0" smtClean="0"/>
+              <a:rPr lang="en-US" dirty="0"/>
               <a:t>Click to Edit Master Title Style</a:t>
             </a:r>
-            <a:endParaRPr lang="en-US" dirty="0"/>
           </a:p>
         </p:txBody>
       </p:sp>
@@ -3726,13 +3702,6 @@
   <p:transition>
     <p:fade/>
   </p:transition>
-  <p:timing>
-    <p:tnLst>
-      <p:par>
-        <p:cTn id="1" dur="indefinite" restart="never" nodeType="tmRoot"/>
-      </p:par>
-    </p:tnLst>
-  </p:timing>
 </p:sldLayout>
 </file>
 
@@ -5119,10 +5088,9 @@
           </a:lstStyle>
           <a:p>
             <a:r>
-              <a:rPr lang="en-US" dirty="0" smtClean="0"/>
+              <a:rPr lang="en-US" dirty="0"/>
               <a:t>Click to edit Master title style</a:t>
             </a:r>
-            <a:endParaRPr lang="en-US" dirty="0"/>
           </a:p>
         </p:txBody>
       </p:sp>
@@ -5218,10 +5186,9 @@
           <a:p>
             <a:pPr lvl="0"/>
             <a:r>
-              <a:rPr lang="en-US" dirty="0" smtClean="0"/>
+              <a:rPr lang="en-US" dirty="0"/>
               <a:t>Click to edit Master</a:t>
             </a:r>
-            <a:endParaRPr lang="en-US" dirty="0"/>
           </a:p>
         </p:txBody>
       </p:sp>
@@ -5235,13 +5202,6 @@
   <p:clrMapOvr>
     <a:masterClrMapping/>
   </p:clrMapOvr>
-  <p:timing>
-    <p:tnLst>
-      <p:par>
-        <p:cTn id="1" dur="indefinite" restart="never" nodeType="tmRoot"/>
-      </p:par>
-    </p:tnLst>
-  </p:timing>
 </p:sldLayout>
 </file>
 
@@ -5413,13 +5373,6 @@
   <p:clrMapOvr>
     <a:masterClrMapping/>
   </p:clrMapOvr>
-  <p:timing>
-    <p:tnLst>
-      <p:par>
-        <p:cTn id="1" dur="indefinite" restart="never" nodeType="tmRoot"/>
-      </p:par>
-    </p:tnLst>
-  </p:timing>
 </p:sldLayout>
 </file>
 
@@ -5506,13 +5459,6 @@
   <p:clrMapOvr>
     <a:masterClrMapping/>
   </p:clrMapOvr>
-  <p:timing>
-    <p:tnLst>
-      <p:par>
-        <p:cTn id="1" dur="indefinite" restart="never" nodeType="tmRoot"/>
-      </p:par>
-    </p:tnLst>
-  </p:timing>
 </p:sldLayout>
 </file>
 
@@ -5571,10 +5517,9 @@
           </a:lstStyle>
           <a:p>
             <a:r>
-              <a:rPr lang="en-US" dirty="0" smtClean="0"/>
+              <a:rPr lang="en-US" dirty="0"/>
               <a:t>Click to Edit Master Title Style</a:t>
             </a:r>
-            <a:endParaRPr lang="en-US" dirty="0"/>
           </a:p>
         </p:txBody>
       </p:sp>
@@ -5591,13 +5536,6 @@
   <p:transition>
     <p:fade/>
   </p:transition>
-  <p:timing>
-    <p:tnLst>
-      <p:par>
-        <p:cTn id="1" dur="indefinite" restart="never" nodeType="tmRoot"/>
-      </p:par>
-    </p:tnLst>
-  </p:timing>
 </p:sldLayout>
 </file>
 
@@ -6970,13 +6908,6 @@
     <p:sldLayoutId id="2147483734" r:id="rId8"/>
     <p:sldLayoutId id="2147483735" r:id="rId9"/>
   </p:sldLayoutIdLst>
-  <p:timing>
-    <p:tnLst>
-      <p:par>
-        <p:cTn id="1" dur="indefinite" restart="never" nodeType="tmRoot"/>
-      </p:par>
-    </p:tnLst>
-  </p:timing>
   <p:hf hdr="0" ftr="0" dt="0"/>
   <p:txStyles>
     <p:titleStyle>
@@ -7303,13 +7234,6 @@
     <p:sldLayoutId id="2147483730" r:id="rId6"/>
     <p:sldLayoutId id="2147483731" r:id="rId7"/>
   </p:sldLayoutIdLst>
-  <p:timing>
-    <p:tnLst>
-      <p:par>
-        <p:cTn id="1" dur="indefinite" restart="never" nodeType="tmRoot"/>
-      </p:par>
-    </p:tnLst>
-  </p:timing>
   <p:hf hdr="0" ftr="0" dt="0"/>
   <p:txStyles>
     <p:titleStyle>
@@ -7722,7 +7646,7 @@
               </a:spcAft>
             </a:pPr>
             <a:r>
-              <a:rPr lang="en-US" sz="4200" b="1" spc="-100" dirty="0" smtClean="0">
+              <a:rPr lang="en-US" sz="4200" b="1" spc="-100" dirty="0">
                 <a:solidFill>
                   <a:srgbClr val="00AE9E"/>
                 </a:solidFill>
@@ -7779,7 +7703,7 @@
               </a:spcAft>
             </a:pPr>
             <a:r>
-              <a:rPr lang="en-US" sz="2800" spc="-100" dirty="0" smtClean="0">
+              <a:rPr lang="en-US" sz="2800" spc="-100" dirty="0">
                 <a:solidFill>
                   <a:schemeClr val="bg1"/>
                 </a:solidFill>
@@ -7794,19 +7718,6 @@
               </a:rPr>
               <a:t>Advancing Spring Boot with Actuator and Profiles</a:t>
             </a:r>
-            <a:endParaRPr lang="en-US" sz="2800" spc="-100" dirty="0">
-              <a:solidFill>
-                <a:schemeClr val="bg1"/>
-              </a:solidFill>
-              <a:effectLst>
-                <a:outerShdw blurRad="50800" dist="38100" dir="5400000" algn="t" rotWithShape="0">
-                  <a:prstClr val="black">
-                    <a:alpha val="40000"/>
-                  </a:prstClr>
-                </a:outerShdw>
-              </a:effectLst>
-              <a:cs typeface="Arial"/>
-            </a:endParaRPr>
           </a:p>
         </p:txBody>
       </p:sp>
@@ -7820,13 +7731,6 @@
   <p:clrMapOvr>
     <a:masterClrMapping/>
   </p:clrMapOvr>
-  <p:timing>
-    <p:tnLst>
-      <p:par>
-        <p:cTn id="1" dur="indefinite" restart="never" nodeType="tmRoot"/>
-      </p:par>
-    </p:tnLst>
-  </p:timing>
 </p:sld>
 </file>
 
@@ -7863,7 +7767,7 @@
           <a:lstStyle/>
           <a:p>
             <a:r>
-              <a:rPr lang="en-US" dirty="0" smtClean="0"/>
+              <a:rPr lang="en-US" dirty="0"/>
               <a:t>Getting Started</a:t>
             </a:r>
             <a:endParaRPr lang="en-US" dirty="0">
@@ -7900,13 +7804,13 @@
               <a:buNone/>
             </a:pPr>
             <a:r>
-              <a:rPr lang="en-US" sz="1400" dirty="0" smtClean="0"/>
+              <a:rPr lang="en-US" sz="1400" dirty="0"/>
               <a:t>Actuator</a:t>
             </a:r>
           </a:p>
           <a:p>
             <a:r>
-              <a:rPr lang="en-US" sz="1400" dirty="0" smtClean="0">
+              <a:rPr lang="en-US" sz="1400" dirty="0">
                 <a:solidFill>
                   <a:srgbClr val="FFFFFF"/>
                 </a:solidFill>
@@ -7917,7 +7821,7 @@
           <a:p>
             <a:pPr lvl="1"/>
             <a:r>
-              <a:rPr lang="en-US" sz="1200" dirty="0" smtClean="0">
+              <a:rPr lang="en-US" sz="1200" dirty="0">
                 <a:solidFill>
                   <a:srgbClr val="FFFFFF"/>
                 </a:solidFill>
@@ -7928,7 +7832,7 @@
           <a:p>
             <a:pPr lvl="1"/>
             <a:r>
-              <a:rPr lang="en-US" sz="1200" dirty="0" smtClean="0">
+              <a:rPr lang="en-US" sz="1200" dirty="0">
                 <a:solidFill>
                   <a:srgbClr val="FFFFFF"/>
                 </a:solidFill>
@@ -7939,7 +7843,7 @@
           <a:p>
             <a:pPr lvl="1"/>
             <a:r>
-              <a:rPr lang="en-US" sz="1200" dirty="0" smtClean="0">
+              <a:rPr lang="en-US" sz="1200" dirty="0">
                 <a:solidFill>
                   <a:srgbClr val="FFFFFF"/>
                 </a:solidFill>
@@ -7950,7 +7854,7 @@
           <a:p>
             <a:pPr lvl="1"/>
             <a:r>
-              <a:rPr lang="en-US" sz="1200" dirty="0" smtClean="0">
+              <a:rPr lang="en-US" sz="1200" dirty="0">
                 <a:solidFill>
                   <a:srgbClr val="FFFFFF"/>
                 </a:solidFill>
@@ -7961,7 +7865,7 @@
           <a:p>
             <a:pPr lvl="1"/>
             <a:r>
-              <a:rPr lang="en-US" sz="1200" dirty="0" smtClean="0">
+              <a:rPr lang="en-US" sz="1200" dirty="0">
                 <a:solidFill>
                   <a:srgbClr val="FFFFFF"/>
                 </a:solidFill>
@@ -8134,7 +8038,7 @@
               <a:buFont typeface="Arial"/>
               <a:buNone/>
             </a:pPr>
-            <a:endParaRPr lang="en-US" sz="1400" dirty="0" smtClean="0"/>
+            <a:endParaRPr lang="en-US" sz="1400" dirty="0"/>
           </a:p>
         </p:txBody>
       </p:sp>
@@ -8172,21 +8076,6 @@
   <p:clrMapOvr>
     <a:masterClrMapping/>
   </p:clrMapOvr>
-  <mc:AlternateContent xmlns:mc="http://schemas.openxmlformats.org/markup-compatibility/2006" xmlns:p14="http://schemas.microsoft.com/office/powerpoint/2010/main">
-    <mc:Choice Requires="p14">
-      <p:transition spd="slow" p14:dur="2000"/>
-    </mc:Choice>
-    <mc:Fallback xmlns="">
-      <p:transition xmlns:p14="http://schemas.microsoft.com/office/powerpoint/2010/main" spd="slow"/>
-    </mc:Fallback>
-  </mc:AlternateContent>
-  <p:timing>
-    <p:tnLst>
-      <p:par>
-        <p:cTn id="1" dur="indefinite" restart="never" nodeType="tmRoot"/>
-      </p:par>
-    </p:tnLst>
-  </p:timing>
 </p:sld>
 </file>
 
@@ -8223,7 +8112,7 @@
           <a:lstStyle/>
           <a:p>
             <a:r>
-              <a:rPr lang="en-US" dirty="0" smtClean="0"/>
+              <a:rPr lang="en-US" dirty="0"/>
               <a:t>Endpoints</a:t>
             </a:r>
             <a:endParaRPr lang="en-US" dirty="0">
@@ -8397,30 +8286,39 @@
               <a:buFont typeface="Arial"/>
               <a:buNone/>
             </a:pPr>
-            <a:endParaRPr lang="en-US" sz="1400" dirty="0" smtClean="0"/>
+            <a:endParaRPr lang="en-US" sz="1400" dirty="0"/>
           </a:p>
         </p:txBody>
       </p:sp>
       <p:pic>
         <p:nvPicPr>
-          <p:cNvPr id="9" name="Content Placeholder 8"/>
+          <p:cNvPr id="6" name="Picture 5">
+            <a:hlinkClick r:id="rId3"/>
+            <a:extLst>
+              <a:ext uri="{FF2B5EF4-FFF2-40B4-BE49-F238E27FC236}">
+                <a16:creationId xmlns:a16="http://schemas.microsoft.com/office/drawing/2014/main" id="{B4E700FD-D851-B148-B15A-11EC11AC1984}"/>
+              </a:ext>
+            </a:extLst>
+          </p:cNvPr>
           <p:cNvPicPr>
-            <a:picLocks noGrp="1" noChangeAspect="1"/>
+            <a:picLocks noChangeAspect="1"/>
           </p:cNvPicPr>
-          <p:nvPr>
-            <p:ph sz="quarter" idx="10"/>
-          </p:nvPr>
+          <p:nvPr/>
         </p:nvPicPr>
-        <p:blipFill rotWithShape="1">
-          <a:blip r:embed="rId3"/>
-          <a:srcRect t="-5381" b="2569"/>
-          <a:stretch/>
+        <p:blipFill>
+          <a:blip r:embed="rId4"/>
+          <a:stretch>
+            <a:fillRect/>
+          </a:stretch>
         </p:blipFill>
         <p:spPr>
           <a:xfrm>
-            <a:off x="1320800" y="834698"/>
-            <a:ext cx="6661825" cy="3676341"/>
+            <a:off x="3047603" y="903375"/>
+            <a:ext cx="3048792" cy="3721177"/>
           </a:xfrm>
+          <a:prstGeom prst="rect">
+            <a:avLst/>
+          </a:prstGeom>
         </p:spPr>
       </p:pic>
     </p:spTree>
@@ -8433,21 +8331,6 @@
   <p:clrMapOvr>
     <a:masterClrMapping/>
   </p:clrMapOvr>
-  <mc:AlternateContent xmlns:mc="http://schemas.openxmlformats.org/markup-compatibility/2006" xmlns:p14="http://schemas.microsoft.com/office/powerpoint/2010/main">
-    <mc:Choice Requires="p14">
-      <p:transition spd="slow" p14:dur="2000"/>
-    </mc:Choice>
-    <mc:Fallback xmlns="">
-      <p:transition xmlns:p14="http://schemas.microsoft.com/office/powerpoint/2010/main" spd="slow"/>
-    </mc:Fallback>
-  </mc:AlternateContent>
-  <p:timing>
-    <p:tnLst>
-      <p:par>
-        <p:cTn id="1" dur="indefinite" restart="never" nodeType="tmRoot"/>
-      </p:par>
-    </p:tnLst>
-  </p:timing>
 </p:sld>
 </file>
 
@@ -8484,7 +8367,7 @@
           <a:lstStyle/>
           <a:p>
             <a:r>
-              <a:rPr lang="en-US" dirty="0" smtClean="0"/>
+              <a:rPr lang="en-US" dirty="0"/>
               <a:t>Health Endpoint</a:t>
             </a:r>
             <a:endParaRPr lang="en-US" dirty="0">
@@ -8658,13 +8541,19 @@
               <a:buFont typeface="Arial"/>
               <a:buNone/>
             </a:pPr>
-            <a:endParaRPr lang="en-US" sz="1400" dirty="0" smtClean="0"/>
+            <a:endParaRPr lang="en-US" sz="1400" dirty="0"/>
           </a:p>
         </p:txBody>
       </p:sp>
       <p:pic>
         <p:nvPicPr>
-          <p:cNvPr id="4" name="Picture 3"/>
+          <p:cNvPr id="5" name="Picture 4">
+            <a:extLst>
+              <a:ext uri="{FF2B5EF4-FFF2-40B4-BE49-F238E27FC236}">
+                <a16:creationId xmlns:a16="http://schemas.microsoft.com/office/drawing/2014/main" id="{E796DBC0-FFDE-4E49-8C8B-16FB44D430F5}"/>
+              </a:ext>
+            </a:extLst>
+          </p:cNvPr>
           <p:cNvPicPr>
             <a:picLocks noChangeAspect="1"/>
           </p:cNvPicPr>
@@ -8678,8 +8567,8 @@
         </p:blipFill>
         <p:spPr>
           <a:xfrm>
-            <a:off x="1371600" y="1353820"/>
-            <a:ext cx="6400800" cy="2971800"/>
+            <a:off x="1650550" y="1043680"/>
+            <a:ext cx="5842897" cy="3467359"/>
           </a:xfrm>
           <a:prstGeom prst="rect">
             <a:avLst/>
@@ -8696,21 +8585,6 @@
   <p:clrMapOvr>
     <a:masterClrMapping/>
   </p:clrMapOvr>
-  <mc:AlternateContent xmlns:mc="http://schemas.openxmlformats.org/markup-compatibility/2006" xmlns:p14="http://schemas.microsoft.com/office/powerpoint/2010/main">
-    <mc:Choice Requires="p14">
-      <p:transition spd="slow" p14:dur="2000"/>
-    </mc:Choice>
-    <mc:Fallback xmlns="">
-      <p:transition xmlns:p14="http://schemas.microsoft.com/office/powerpoint/2010/main" spd="slow"/>
-    </mc:Fallback>
-  </mc:AlternateContent>
-  <p:timing>
-    <p:tnLst>
-      <p:par>
-        <p:cTn id="1" dur="indefinite" restart="never" nodeType="tmRoot"/>
-      </p:par>
-    </p:tnLst>
-  </p:timing>
 </p:sld>
 </file>
 
@@ -8747,7 +8621,7 @@
           <a:lstStyle/>
           <a:p>
             <a:r>
-              <a:rPr lang="en-US" dirty="0" smtClean="0"/>
+              <a:rPr lang="en-US" dirty="0"/>
               <a:t>Health Indicators</a:t>
             </a:r>
             <a:endParaRPr lang="en-US" dirty="0">
@@ -8921,7 +8795,7 @@
               <a:buFont typeface="Arial"/>
               <a:buNone/>
             </a:pPr>
-            <a:endParaRPr lang="en-US" sz="1400" dirty="0" smtClean="0"/>
+            <a:endParaRPr lang="en-US" sz="1400" dirty="0"/>
           </a:p>
         </p:txBody>
       </p:sp>
@@ -8950,8 +8824,20 @@
                 <a:tableStyleId>{C083E6E3-FA7D-4D7B-A595-EF9225AFEA82}</a:tableStyleId>
               </a:tblPr>
               <a:tblGrid>
-                <a:gridCol w="4399280"/>
-                <a:gridCol w="4399280"/>
+                <a:gridCol w="4399280">
+                  <a:extLst>
+                    <a:ext uri="{9D8B030D-6E8A-4147-A177-3AD203B41FA5}">
+                      <a16:colId xmlns:a16="http://schemas.microsoft.com/office/drawing/2014/main" val="20000"/>
+                    </a:ext>
+                  </a:extLst>
+                </a:gridCol>
+                <a:gridCol w="4399280">
+                  <a:extLst>
+                    <a:ext uri="{9D8B030D-6E8A-4147-A177-3AD203B41FA5}">
+                      <a16:colId xmlns:a16="http://schemas.microsoft.com/office/drawing/2014/main" val="20001"/>
+                    </a:ext>
+                  </a:extLst>
+                </a:gridCol>
               </a:tblGrid>
               <a:tr h="347122">
                 <a:tc>
@@ -8960,18 +8846,13 @@
                     <a:lstStyle/>
                     <a:p>
                       <a:r>
-                        <a:rPr lang="en-US" b="1" dirty="0" smtClean="0">
+                        <a:rPr lang="en-US" b="1" dirty="0">
                           <a:solidFill>
                             <a:schemeClr val="bg2"/>
                           </a:solidFill>
                         </a:rPr>
                         <a:t>Health Indicator	</a:t>
                       </a:r>
-                      <a:endParaRPr lang="en-US" b="1" dirty="0">
-                        <a:solidFill>
-                          <a:schemeClr val="bg2"/>
-                        </a:solidFill>
-                      </a:endParaRPr>
                     </a:p>
                   </a:txBody>
                   <a:tcPr/>
@@ -8982,7 +8863,7 @@
                     <a:lstStyle/>
                     <a:p>
                       <a:r>
-                        <a:rPr lang="en-US" dirty="0" smtClean="0">
+                        <a:rPr lang="en-US" dirty="0">
                           <a:solidFill>
                             <a:schemeClr val="bg2"/>
                           </a:solidFill>
@@ -8993,6 +8874,11 @@
                   </a:txBody>
                   <a:tcPr/>
                 </a:tc>
+                <a:extLst>
+                  <a:ext uri="{0D108BD9-81ED-4DB2-BD59-A6C34878D82A}">
+                    <a16:rowId xmlns:a16="http://schemas.microsoft.com/office/drawing/2014/main" val="10000"/>
+                  </a:ext>
+                </a:extLst>
               </a:tr>
               <a:tr h="347122">
                 <a:tc>
@@ -9001,7 +8887,7 @@
                     <a:lstStyle/>
                     <a:p>
                       <a:r>
-                        <a:rPr lang="en-US" dirty="0" err="1" smtClean="0">
+                        <a:rPr lang="en-US" dirty="0" err="1">
                           <a:solidFill>
                             <a:schemeClr val="bg2"/>
                           </a:solidFill>
@@ -9023,7 +8909,7 @@
                     <a:lstStyle/>
                     <a:p>
                       <a:r>
-                        <a:rPr lang="en-US" dirty="0" smtClean="0">
+                        <a:rPr lang="en-US" dirty="0">
                           <a:solidFill>
                             <a:schemeClr val="bg2"/>
                           </a:solidFill>
@@ -9031,7 +8917,7 @@
                         <a:t>Checks for low </a:t>
                       </a:r>
                       <a:r>
-                        <a:rPr lang="en-US" dirty="0" smtClean="0">
+                        <a:rPr lang="en-US" dirty="0">
                           <a:solidFill>
                             <a:schemeClr val="accent6"/>
                           </a:solidFill>
@@ -9039,7 +8925,7 @@
                         <a:t>Disk</a:t>
                       </a:r>
                       <a:r>
-                        <a:rPr lang="en-US" dirty="0" smtClean="0">
+                        <a:rPr lang="en-US" dirty="0">
                           <a:solidFill>
                             <a:schemeClr val="bg2"/>
                           </a:solidFill>
@@ -9050,6 +8936,11 @@
                   </a:txBody>
                   <a:tcPr/>
                 </a:tc>
+                <a:extLst>
+                  <a:ext uri="{0D108BD9-81ED-4DB2-BD59-A6C34878D82A}">
+                    <a16:rowId xmlns:a16="http://schemas.microsoft.com/office/drawing/2014/main" val="10001"/>
+                  </a:ext>
+                </a:extLst>
               </a:tr>
               <a:tr h="359578">
                 <a:tc>
@@ -9058,7 +8949,7 @@
                     <a:lstStyle/>
                     <a:p>
                       <a:r>
-                        <a:rPr lang="en-US" dirty="0" err="1" smtClean="0">
+                        <a:rPr lang="en-US" dirty="0" err="1">
                           <a:solidFill>
                             <a:schemeClr val="bg2"/>
                           </a:solidFill>
@@ -9080,7 +8971,7 @@
                     <a:lstStyle/>
                     <a:p>
                       <a:r>
-                        <a:rPr lang="en-US" dirty="0" smtClean="0">
+                        <a:rPr lang="en-US" dirty="0">
                           <a:solidFill>
                             <a:schemeClr val="bg2"/>
                           </a:solidFill>
@@ -9088,7 +8979,7 @@
                         <a:t>Check </a:t>
                       </a:r>
                       <a:r>
-                        <a:rPr lang="en-US" dirty="0" err="1" smtClean="0">
+                        <a:rPr lang="en-US" dirty="0" err="1">
                           <a:solidFill>
                             <a:srgbClr val="F79646"/>
                           </a:solidFill>
@@ -9096,7 +8987,7 @@
                         <a:t>DataSource</a:t>
                       </a:r>
                       <a:r>
-                        <a:rPr lang="en-US" dirty="0" smtClean="0">
+                        <a:rPr lang="en-US" dirty="0">
                           <a:solidFill>
                             <a:srgbClr val="F79646"/>
                           </a:solidFill>
@@ -9104,7 +8995,7 @@
                         <a:t> </a:t>
                       </a:r>
                       <a:r>
-                        <a:rPr lang="en-US" dirty="0" smtClean="0">
+                        <a:rPr lang="en-US" dirty="0">
                           <a:solidFill>
                             <a:schemeClr val="bg2"/>
                           </a:solidFill>
@@ -9115,6 +9006,11 @@
                   </a:txBody>
                   <a:tcPr/>
                 </a:tc>
+                <a:extLst>
+                  <a:ext uri="{0D108BD9-81ED-4DB2-BD59-A6C34878D82A}">
+                    <a16:rowId xmlns:a16="http://schemas.microsoft.com/office/drawing/2014/main" val="10002"/>
+                  </a:ext>
+                </a:extLst>
               </a:tr>
               <a:tr h="359578">
                 <a:tc>
@@ -9123,7 +9019,7 @@
                     <a:lstStyle/>
                     <a:p>
                       <a:r>
-                        <a:rPr lang="en-US" dirty="0" err="1" smtClean="0">
+                        <a:rPr lang="en-US" dirty="0" err="1">
                           <a:solidFill>
                             <a:schemeClr val="bg2"/>
                           </a:solidFill>
@@ -9145,7 +9041,7 @@
                     <a:lstStyle/>
                     <a:p>
                       <a:r>
-                        <a:rPr lang="en-US" dirty="0" smtClean="0">
+                        <a:rPr lang="en-US" dirty="0">
                           <a:solidFill>
                             <a:schemeClr val="bg2"/>
                           </a:solidFill>
@@ -9153,7 +9049,7 @@
                         <a:t>Checks </a:t>
                       </a:r>
                       <a:r>
-                        <a:rPr lang="en-US" dirty="0" err="1" smtClean="0">
+                        <a:rPr lang="en-US" dirty="0" err="1">
                           <a:solidFill>
                             <a:srgbClr val="F79646"/>
                           </a:solidFill>
@@ -9161,7 +9057,7 @@
                         <a:t>ElasticSearch</a:t>
                       </a:r>
                       <a:r>
-                        <a:rPr lang="en-US" dirty="0" smtClean="0">
+                        <a:rPr lang="en-US" dirty="0">
                           <a:solidFill>
                             <a:srgbClr val="F79646"/>
                           </a:solidFill>
@@ -9169,7 +9065,7 @@
                         <a:t> </a:t>
                       </a:r>
                       <a:r>
-                        <a:rPr lang="en-US" dirty="0" smtClean="0">
+                        <a:rPr lang="en-US" dirty="0">
                           <a:solidFill>
                             <a:schemeClr val="bg2"/>
                           </a:solidFill>
@@ -9180,6 +9076,11 @@
                   </a:txBody>
                   <a:tcPr/>
                 </a:tc>
+                <a:extLst>
+                  <a:ext uri="{0D108BD9-81ED-4DB2-BD59-A6C34878D82A}">
+                    <a16:rowId xmlns:a16="http://schemas.microsoft.com/office/drawing/2014/main" val="10003"/>
+                  </a:ext>
+                </a:extLst>
               </a:tr>
               <a:tr h="359578">
                 <a:tc>
@@ -9188,7 +9089,7 @@
                     <a:lstStyle/>
                     <a:p>
                       <a:r>
-                        <a:rPr lang="en-US" dirty="0" err="1" smtClean="0">
+                        <a:rPr lang="en-US" dirty="0" err="1">
                           <a:solidFill>
                             <a:schemeClr val="bg2"/>
                           </a:solidFill>
@@ -9210,7 +9111,7 @@
                     <a:lstStyle/>
                     <a:p>
                       <a:r>
-                        <a:rPr lang="en-US" dirty="0" smtClean="0">
+                        <a:rPr lang="en-US" dirty="0">
                           <a:solidFill>
                             <a:schemeClr val="bg2"/>
                           </a:solidFill>
@@ -9218,7 +9119,7 @@
                         <a:t>Checks that a </a:t>
                       </a:r>
                       <a:r>
-                        <a:rPr lang="en-US" dirty="0" smtClean="0">
+                        <a:rPr lang="en-US" dirty="0">
                           <a:solidFill>
                             <a:srgbClr val="F79646"/>
                           </a:solidFill>
@@ -9226,7 +9127,7 @@
                         <a:t>JMS</a:t>
                       </a:r>
                       <a:r>
-                        <a:rPr lang="en-US" dirty="0" smtClean="0">
+                        <a:rPr lang="en-US" dirty="0">
                           <a:solidFill>
                             <a:schemeClr val="bg2"/>
                           </a:solidFill>
@@ -9237,6 +9138,11 @@
                   </a:txBody>
                   <a:tcPr/>
                 </a:tc>
+                <a:extLst>
+                  <a:ext uri="{0D108BD9-81ED-4DB2-BD59-A6C34878D82A}">
+                    <a16:rowId xmlns:a16="http://schemas.microsoft.com/office/drawing/2014/main" val="10004"/>
+                  </a:ext>
+                </a:extLst>
               </a:tr>
               <a:tr h="359578">
                 <a:tc>
@@ -9245,7 +9151,7 @@
                     <a:lstStyle/>
                     <a:p>
                       <a:r>
-                        <a:rPr lang="en-US" dirty="0" err="1" smtClean="0">
+                        <a:rPr lang="en-US" dirty="0" err="1">
                           <a:solidFill>
                             <a:schemeClr val="bg2"/>
                           </a:solidFill>
@@ -9267,7 +9173,7 @@
                     <a:lstStyle/>
                     <a:p>
                       <a:r>
-                        <a:rPr lang="en-US" dirty="0" smtClean="0">
+                        <a:rPr lang="en-US" dirty="0">
                           <a:solidFill>
                             <a:schemeClr val="bg2"/>
                           </a:solidFill>
@@ -9275,7 +9181,7 @@
                         <a:t>Checks that a </a:t>
                       </a:r>
                       <a:r>
-                        <a:rPr lang="en-US" dirty="0" smtClean="0">
+                        <a:rPr lang="en-US" dirty="0">
                           <a:solidFill>
                             <a:srgbClr val="F79646"/>
                           </a:solidFill>
@@ -9283,7 +9189,7 @@
                         <a:t>mail</a:t>
                       </a:r>
                       <a:r>
-                        <a:rPr lang="en-US" dirty="0" smtClean="0">
+                        <a:rPr lang="en-US" dirty="0">
                           <a:solidFill>
                             <a:schemeClr val="bg2"/>
                           </a:solidFill>
@@ -9294,6 +9200,11 @@
                   </a:txBody>
                   <a:tcPr/>
                 </a:tc>
+                <a:extLst>
+                  <a:ext uri="{0D108BD9-81ED-4DB2-BD59-A6C34878D82A}">
+                    <a16:rowId xmlns:a16="http://schemas.microsoft.com/office/drawing/2014/main" val="10005"/>
+                  </a:ext>
+                </a:extLst>
               </a:tr>
               <a:tr h="359578">
                 <a:tc>
@@ -9302,7 +9213,7 @@
                     <a:lstStyle/>
                     <a:p>
                       <a:r>
-                        <a:rPr lang="en-US" dirty="0" err="1" smtClean="0">
+                        <a:rPr lang="en-US" dirty="0" err="1">
                           <a:solidFill>
                             <a:schemeClr val="bg2"/>
                           </a:solidFill>
@@ -9324,7 +9235,7 @@
                     <a:lstStyle/>
                     <a:p>
                       <a:r>
-                        <a:rPr lang="en-US" dirty="0" err="1" smtClean="0">
+                        <a:rPr lang="en-US" dirty="0" err="1">
                           <a:solidFill>
                             <a:schemeClr val="bg2"/>
                           </a:solidFill>
@@ -9332,7 +9243,7 @@
                         <a:t>Cheks</a:t>
                       </a:r>
                       <a:r>
-                        <a:rPr lang="en-US" dirty="0" smtClean="0">
+                        <a:rPr lang="en-US" dirty="0">
                           <a:solidFill>
                             <a:schemeClr val="bg2"/>
                           </a:solidFill>
@@ -9340,7 +9251,7 @@
                         <a:t> that a </a:t>
                       </a:r>
                       <a:r>
-                        <a:rPr lang="en-US" dirty="0" smtClean="0">
+                        <a:rPr lang="en-US" dirty="0">
                           <a:solidFill>
                             <a:srgbClr val="F79646"/>
                           </a:solidFill>
@@ -9348,7 +9259,7 @@
                         <a:t>Mongo</a:t>
                       </a:r>
                       <a:r>
-                        <a:rPr lang="en-US" dirty="0" smtClean="0">
+                        <a:rPr lang="en-US" dirty="0">
                           <a:solidFill>
                             <a:schemeClr val="bg2"/>
                           </a:solidFill>
@@ -9359,6 +9270,11 @@
                   </a:txBody>
                   <a:tcPr/>
                 </a:tc>
+                <a:extLst>
+                  <a:ext uri="{0D108BD9-81ED-4DB2-BD59-A6C34878D82A}">
+                    <a16:rowId xmlns:a16="http://schemas.microsoft.com/office/drawing/2014/main" val="10006"/>
+                  </a:ext>
+                </a:extLst>
               </a:tr>
               <a:tr h="359578">
                 <a:tc>
@@ -9367,7 +9283,7 @@
                     <a:lstStyle/>
                     <a:p>
                       <a:r>
-                        <a:rPr lang="en-US" dirty="0" err="1" smtClean="0">
+                        <a:rPr lang="en-US" dirty="0" err="1">
                           <a:solidFill>
                             <a:schemeClr val="bg2"/>
                           </a:solidFill>
@@ -9389,7 +9305,7 @@
                     <a:lstStyle/>
                     <a:p>
                       <a:r>
-                        <a:rPr lang="en-US" dirty="0" smtClean="0">
+                        <a:rPr lang="en-US" dirty="0">
                           <a:solidFill>
                             <a:schemeClr val="bg2"/>
                           </a:solidFill>
@@ -9397,7 +9313,7 @@
                         <a:t>Checks that a </a:t>
                       </a:r>
                       <a:r>
-                        <a:rPr lang="en-US" dirty="0" smtClean="0">
+                        <a:rPr lang="en-US" dirty="0">
                           <a:solidFill>
                             <a:srgbClr val="F79646"/>
                           </a:solidFill>
@@ -9405,7 +9321,7 @@
                         <a:t>Rabbit</a:t>
                       </a:r>
                       <a:r>
-                        <a:rPr lang="en-US" dirty="0" smtClean="0">
+                        <a:rPr lang="en-US" dirty="0">
                           <a:solidFill>
                             <a:schemeClr val="bg2"/>
                           </a:solidFill>
@@ -9416,6 +9332,11 @@
                   </a:txBody>
                   <a:tcPr/>
                 </a:tc>
+                <a:extLst>
+                  <a:ext uri="{0D108BD9-81ED-4DB2-BD59-A6C34878D82A}">
+                    <a16:rowId xmlns:a16="http://schemas.microsoft.com/office/drawing/2014/main" val="10007"/>
+                  </a:ext>
+                </a:extLst>
               </a:tr>
               <a:tr h="359578">
                 <a:tc>
@@ -9424,7 +9345,7 @@
                     <a:lstStyle/>
                     <a:p>
                       <a:r>
-                        <a:rPr lang="en-US" dirty="0" err="1" smtClean="0">
+                        <a:rPr lang="en-US" dirty="0" err="1">
                           <a:solidFill>
                             <a:schemeClr val="bg2"/>
                           </a:solidFill>
@@ -9446,7 +9367,7 @@
                     <a:lstStyle/>
                     <a:p>
                       <a:r>
-                        <a:rPr lang="en-US" dirty="0" smtClean="0">
+                        <a:rPr lang="en-US" dirty="0">
                           <a:solidFill>
                             <a:schemeClr val="bg2"/>
                           </a:solidFill>
@@ -9454,7 +9375,7 @@
                         <a:t>Checks that a </a:t>
                       </a:r>
                       <a:r>
-                        <a:rPr lang="en-US" dirty="0" err="1" smtClean="0">
+                        <a:rPr lang="en-US" dirty="0" err="1">
                           <a:solidFill>
                             <a:srgbClr val="F79646"/>
                           </a:solidFill>
@@ -9462,7 +9383,7 @@
                         <a:t>Redis</a:t>
                       </a:r>
                       <a:r>
-                        <a:rPr lang="en-US" dirty="0" smtClean="0">
+                        <a:rPr lang="en-US" dirty="0">
                           <a:solidFill>
                             <a:srgbClr val="F79646"/>
                           </a:solidFill>
@@ -9470,7 +9391,7 @@
                         <a:t> </a:t>
                       </a:r>
                       <a:r>
-                        <a:rPr lang="en-US" dirty="0" smtClean="0">
+                        <a:rPr lang="en-US" dirty="0">
                           <a:solidFill>
                             <a:schemeClr val="bg2"/>
                           </a:solidFill>
@@ -9481,6 +9402,11 @@
                   </a:txBody>
                   <a:tcPr/>
                 </a:tc>
+                <a:extLst>
+                  <a:ext uri="{0D108BD9-81ED-4DB2-BD59-A6C34878D82A}">
+                    <a16:rowId xmlns:a16="http://schemas.microsoft.com/office/drawing/2014/main" val="10008"/>
+                  </a:ext>
+                </a:extLst>
               </a:tr>
               <a:tr h="359578">
                 <a:tc>
@@ -9489,7 +9415,7 @@
                     <a:lstStyle/>
                     <a:p>
                       <a:r>
-                        <a:rPr lang="en-US" dirty="0" err="1" smtClean="0">
+                        <a:rPr lang="en-US" dirty="0" err="1">
                           <a:solidFill>
                             <a:schemeClr val="bg2"/>
                           </a:solidFill>
@@ -9511,7 +9437,7 @@
                     <a:lstStyle/>
                     <a:p>
                       <a:r>
-                        <a:rPr lang="en-US" dirty="0" smtClean="0">
+                        <a:rPr lang="en-US" dirty="0">
                           <a:solidFill>
                             <a:schemeClr val="bg2"/>
                           </a:solidFill>
@@ -9519,7 +9445,7 @@
                         <a:t>Checks that a </a:t>
                       </a:r>
                       <a:r>
-                        <a:rPr lang="en-US" dirty="0" err="1" smtClean="0">
+                        <a:rPr lang="en-US" dirty="0" err="1">
                           <a:solidFill>
                             <a:srgbClr val="F79646"/>
                           </a:solidFill>
@@ -9527,7 +9453,7 @@
                         <a:t>Solr</a:t>
                       </a:r>
                       <a:r>
-                        <a:rPr lang="en-US" dirty="0" smtClean="0">
+                        <a:rPr lang="en-US" dirty="0">
                           <a:solidFill>
                             <a:srgbClr val="F79646"/>
                           </a:solidFill>
@@ -9535,7 +9461,7 @@
                         <a:t> </a:t>
                       </a:r>
                       <a:r>
-                        <a:rPr lang="en-US" dirty="0" smtClean="0">
+                        <a:rPr lang="en-US" dirty="0">
                           <a:solidFill>
                             <a:schemeClr val="bg2"/>
                           </a:solidFill>
@@ -9546,6 +9472,11 @@
                   </a:txBody>
                   <a:tcPr/>
                 </a:tc>
+                <a:extLst>
+                  <a:ext uri="{0D108BD9-81ED-4DB2-BD59-A6C34878D82A}">
+                    <a16:rowId xmlns:a16="http://schemas.microsoft.com/office/drawing/2014/main" val="10009"/>
+                  </a:ext>
+                </a:extLst>
               </a:tr>
             </a:tbl>
           </a:graphicData>
@@ -9561,21 +9492,6 @@
   <p:clrMapOvr>
     <a:masterClrMapping/>
   </p:clrMapOvr>
-  <mc:AlternateContent xmlns:mc="http://schemas.openxmlformats.org/markup-compatibility/2006" xmlns:p14="http://schemas.microsoft.com/office/powerpoint/2010/main">
-    <mc:Choice Requires="p14">
-      <p:transition spd="slow" p14:dur="2000"/>
-    </mc:Choice>
-    <mc:Fallback xmlns="">
-      <p:transition xmlns:p14="http://schemas.microsoft.com/office/powerpoint/2010/main" spd="slow"/>
-    </mc:Fallback>
-  </mc:AlternateContent>
-  <p:timing>
-    <p:tnLst>
-      <p:par>
-        <p:cTn id="1" dur="indefinite" restart="never" nodeType="tmRoot"/>
-      </p:par>
-    </p:tnLst>
-  </p:timing>
 </p:sld>
 </file>
 
@@ -9612,145 +9528,14 @@
           <a:lstStyle/>
           <a:p>
             <a:r>
-              <a:rPr lang="en-US" dirty="0" smtClean="0"/>
-              <a:t>HTTP Access</a:t>
+              <a:rPr lang="en-US" dirty="0"/>
+              <a:t>Securing HTTP Endpoints</a:t>
             </a:r>
             <a:endParaRPr lang="en-US" dirty="0">
               <a:solidFill>
                 <a:srgbClr val="138A7E"/>
               </a:solidFill>
             </a:endParaRPr>
-          </a:p>
-        </p:txBody>
-      </p:sp>
-      <p:sp>
-        <p:nvSpPr>
-          <p:cNvPr id="3" name="Content Placeholder 2"/>
-          <p:cNvSpPr>
-            <a:spLocks noGrp="1"/>
-          </p:cNvSpPr>
-          <p:nvPr>
-            <p:ph sz="quarter" idx="10"/>
-          </p:nvPr>
-        </p:nvSpPr>
-        <p:spPr>
-          <a:xfrm>
-            <a:off x="457199" y="1108075"/>
-            <a:ext cx="4378961" cy="1990725"/>
-          </a:xfrm>
-        </p:spPr>
-        <p:txBody>
-          <a:bodyPr>
-            <a:normAutofit/>
-          </a:bodyPr>
-          <a:lstStyle/>
-          <a:p>
-            <a:pPr marL="0" indent="0">
-              <a:buNone/>
-            </a:pPr>
-            <a:r>
-              <a:rPr lang="en-US" sz="1400" dirty="0" smtClean="0"/>
-              <a:t>Importing Spring Security Dependency</a:t>
-            </a:r>
-          </a:p>
-          <a:p>
-            <a:pPr marL="0" indent="0">
-              <a:buNone/>
-            </a:pPr>
-            <a:endParaRPr lang="en-US" sz="1400" b="1" i="1" u="sng" dirty="0">
-              <a:solidFill>
-                <a:srgbClr val="FFFFFF"/>
-              </a:solidFill>
-            </a:endParaRPr>
-          </a:p>
-          <a:p>
-            <a:pPr marL="0" indent="0">
-              <a:buNone/>
-            </a:pPr>
-            <a:endParaRPr lang="en-US" sz="1400" b="1" i="1" u="sng" dirty="0" smtClean="0">
-              <a:solidFill>
-                <a:srgbClr val="FFFFFF"/>
-              </a:solidFill>
-            </a:endParaRPr>
-          </a:p>
-          <a:p>
-            <a:pPr marL="0" indent="0">
-              <a:buNone/>
-            </a:pPr>
-            <a:endParaRPr lang="en-US" sz="1400" b="1" i="1" u="sng" dirty="0">
-              <a:solidFill>
-                <a:srgbClr val="FFFFFF"/>
-              </a:solidFill>
-            </a:endParaRPr>
-          </a:p>
-          <a:p>
-            <a:pPr marL="0" indent="0">
-              <a:buNone/>
-            </a:pPr>
-            <a:endParaRPr lang="en-US" sz="1400" b="1" i="1" u="sng" dirty="0" smtClean="0">
-              <a:solidFill>
-                <a:srgbClr val="FFFFFF"/>
-              </a:solidFill>
-            </a:endParaRPr>
-          </a:p>
-          <a:p>
-            <a:pPr marL="0" indent="0">
-              <a:buNone/>
-            </a:pPr>
-            <a:endParaRPr lang="en-US" sz="1400" b="1" i="1" u="sng" dirty="0">
-              <a:solidFill>
-                <a:srgbClr val="FFFFFF"/>
-              </a:solidFill>
-            </a:endParaRPr>
-          </a:p>
-          <a:p>
-            <a:pPr marL="0" indent="0">
-              <a:buNone/>
-            </a:pPr>
-            <a:r>
-              <a:rPr lang="en-US" sz="1400" dirty="0" smtClean="0">
-                <a:solidFill>
-                  <a:srgbClr val="FFFFFF"/>
-                </a:solidFill>
-              </a:rPr>
-              <a:t>Setting required Authentication &amp; Authorization Roles</a:t>
-            </a:r>
-          </a:p>
-          <a:p>
-            <a:pPr marL="0" indent="0">
-              <a:buNone/>
-            </a:pPr>
-            <a:endParaRPr lang="en-US" sz="1400" dirty="0">
-              <a:solidFill>
-                <a:srgbClr val="FFFFFF"/>
-              </a:solidFill>
-            </a:endParaRPr>
-          </a:p>
-          <a:p>
-            <a:pPr marL="0" indent="0">
-              <a:buNone/>
-            </a:pPr>
-            <a:endParaRPr lang="en-US" sz="1400" dirty="0" smtClean="0">
-              <a:solidFill>
-                <a:srgbClr val="FFFFFF"/>
-              </a:solidFill>
-            </a:endParaRPr>
-          </a:p>
-          <a:p>
-            <a:pPr marL="0" indent="0">
-              <a:buNone/>
-            </a:pPr>
-            <a:endParaRPr lang="en-US" sz="1400" dirty="0">
-              <a:solidFill>
-                <a:srgbClr val="FFFFFF"/>
-              </a:solidFill>
-            </a:endParaRPr>
-          </a:p>
-          <a:p>
-            <a:pPr marL="0" indent="0">
-              <a:buNone/>
-            </a:pPr>
-            <a:endParaRPr lang="en-US" sz="1400" dirty="0" smtClean="0"/>
           </a:p>
         </p:txBody>
       </p:sp>
@@ -9917,58 +9702,64 @@
               <a:buFont typeface="Arial"/>
               <a:buNone/>
             </a:pPr>
-            <a:endParaRPr lang="en-US" sz="1400" dirty="0" smtClean="0"/>
+            <a:endParaRPr lang="en-US" sz="1400" dirty="0"/>
           </a:p>
         </p:txBody>
       </p:sp>
       <p:pic>
         <p:nvPicPr>
-          <p:cNvPr id="5" name="Picture 4"/>
+          <p:cNvPr id="11" name="Content Placeholder 10">
+            <a:hlinkClick r:id="rId3"/>
+            <a:extLst>
+              <a:ext uri="{FF2B5EF4-FFF2-40B4-BE49-F238E27FC236}">
+                <a16:creationId xmlns:a16="http://schemas.microsoft.com/office/drawing/2014/main" id="{7EAE231C-A8F9-B347-997D-8D3D0FCC9DCB}"/>
+              </a:ext>
+            </a:extLst>
+          </p:cNvPr>
+          <p:cNvPicPr>
+            <a:picLocks noGrp="1" noChangeAspect="1"/>
+          </p:cNvPicPr>
+          <p:nvPr>
+            <p:ph sz="quarter" idx="10"/>
+          </p:nvPr>
+        </p:nvPicPr>
+        <p:blipFill>
+          <a:blip r:embed="rId4"/>
+          <a:stretch>
+            <a:fillRect/>
+          </a:stretch>
+        </p:blipFill>
+        <p:spPr>
+          <a:xfrm>
+            <a:off x="4738385" y="1010840"/>
+            <a:ext cx="4303523" cy="3500199"/>
+          </a:xfrm>
+        </p:spPr>
+      </p:pic>
+      <p:pic>
+        <p:nvPicPr>
+          <p:cNvPr id="13" name="Picture 12">
+            <a:extLst>
+              <a:ext uri="{FF2B5EF4-FFF2-40B4-BE49-F238E27FC236}">
+                <a16:creationId xmlns:a16="http://schemas.microsoft.com/office/drawing/2014/main" id="{5A4893D5-5038-404E-BF1C-64DB64C7CDEB}"/>
+              </a:ext>
+            </a:extLst>
+          </p:cNvPr>
           <p:cNvPicPr>
             <a:picLocks noChangeAspect="1"/>
           </p:cNvPicPr>
           <p:nvPr/>
         </p:nvPicPr>
         <p:blipFill>
-          <a:blip r:embed="rId3"/>
+          <a:blip r:embed="rId5"/>
           <a:stretch>
             <a:fillRect/>
           </a:stretch>
         </p:blipFill>
         <p:spPr>
           <a:xfrm>
-            <a:off x="1419336" y="3098800"/>
-            <a:ext cx="3797300" cy="1028700"/>
-          </a:xfrm>
-          <a:prstGeom prst="rect">
-            <a:avLst/>
-          </a:prstGeom>
-        </p:spPr>
-      </p:pic>
-      <p:pic>
-        <p:nvPicPr>
-          <p:cNvPr id="6" name="Picture 5"/>
-          <p:cNvPicPr>
-            <a:picLocks noChangeAspect="1"/>
-          </p:cNvPicPr>
-          <p:nvPr/>
-        </p:nvPicPr>
-        <p:blipFill>
-          <a:blip r:embed="rId4">
-            <a:extLst>
-              <a:ext uri="{28A0092B-C50C-407E-A947-70E740481C1C}">
-                <a14:useLocalDpi xmlns:a14="http://schemas.microsoft.com/office/drawing/2010/main" val="0"/>
-              </a:ext>
-            </a:extLst>
-          </a:blip>
-          <a:stretch>
-            <a:fillRect/>
-          </a:stretch>
-        </p:blipFill>
-        <p:spPr>
-          <a:xfrm>
-            <a:off x="1419336" y="1569742"/>
-            <a:ext cx="5826015" cy="812666"/>
+            <a:off x="79902" y="1373979"/>
+            <a:ext cx="4548523" cy="1182790"/>
           </a:xfrm>
           <a:prstGeom prst="rect">
             <a:avLst/>
@@ -9985,21 +9776,6 @@
   <p:clrMapOvr>
     <a:masterClrMapping/>
   </p:clrMapOvr>
-  <mc:AlternateContent xmlns:mc="http://schemas.openxmlformats.org/markup-compatibility/2006" xmlns:p14="http://schemas.microsoft.com/office/powerpoint/2010/main">
-    <mc:Choice Requires="p14">
-      <p:transition spd="slow" p14:dur="2000"/>
-    </mc:Choice>
-    <mc:Fallback xmlns="">
-      <p:transition xmlns:p14="http://schemas.microsoft.com/office/powerpoint/2010/main" spd="slow"/>
-    </mc:Fallback>
-  </mc:AlternateContent>
-  <p:timing>
-    <p:tnLst>
-      <p:par>
-        <p:cTn id="1" dur="indefinite" restart="never" nodeType="tmRoot"/>
-      </p:par>
-    </p:tnLst>
-  </p:timing>
 </p:sld>
 </file>
 
@@ -10036,7 +9812,7 @@
           <a:lstStyle/>
           <a:p>
             <a:r>
-              <a:rPr lang="en-US" dirty="0" smtClean="0"/>
+              <a:rPr lang="en-US" dirty="0"/>
               <a:t>Metrics</a:t>
             </a:r>
             <a:endParaRPr lang="en-US" dirty="0">
@@ -10059,8 +9835,8 @@
         </p:nvSpPr>
         <p:spPr>
           <a:xfrm>
-            <a:off x="123018" y="1108075"/>
-            <a:ext cx="6761089" cy="696955"/>
+            <a:off x="27503" y="1023014"/>
+            <a:ext cx="4919499" cy="3402964"/>
           </a:xfrm>
         </p:spPr>
         <p:txBody>
@@ -10073,9 +9849,119 @@
               <a:buNone/>
             </a:pPr>
             <a:r>
-              <a:rPr lang="en-US" sz="1400" dirty="0" smtClean="0"/>
-              <a:t>Spring Boot Actuator includes a metrics service with ‘gauge’ and ‘counter support</a:t>
+              <a:rPr lang="en-US" sz="1400" dirty="0"/>
+              <a:t>Spring Boot Actuator includes </a:t>
             </a:r>
+            <a:r>
+              <a:rPr lang="en-US" sz="1400" dirty="0">
+                <a:hlinkClick r:id="rId3"/>
+              </a:rPr>
+              <a:t>Micrometer</a:t>
+            </a:r>
+            <a:endParaRPr lang="en-US" sz="1400" dirty="0"/>
+          </a:p>
+          <a:p>
+            <a:pPr marL="0" indent="0">
+              <a:buNone/>
+            </a:pPr>
+            <a:endParaRPr lang="en-US" sz="1400" dirty="0"/>
+          </a:p>
+          <a:p>
+            <a:pPr marL="0" indent="0">
+              <a:buNone/>
+            </a:pPr>
+            <a:r>
+              <a:rPr lang="en-US" sz="1400" dirty="0"/>
+              <a:t>Micrometer packs with a supported set of </a:t>
+            </a:r>
+            <a:r>
+              <a:rPr lang="en-US" sz="1400" b="1" dirty="0"/>
+              <a:t>Meter</a:t>
+            </a:r>
+            <a:r>
+              <a:rPr lang="en-US" sz="1400" dirty="0"/>
+              <a:t> primitives,</a:t>
+            </a:r>
+          </a:p>
+          <a:p>
+            <a:pPr marL="0" indent="0">
+              <a:buNone/>
+            </a:pPr>
+            <a:r>
+              <a:rPr lang="en-US" sz="1400" dirty="0"/>
+              <a:t>including: </a:t>
+            </a:r>
+            <a:r>
+              <a:rPr lang="en-US" sz="1400" b="1" dirty="0"/>
+              <a:t>Timer</a:t>
+            </a:r>
+            <a:r>
+              <a:rPr lang="en-US" sz="1400" dirty="0"/>
+              <a:t>, </a:t>
+            </a:r>
+            <a:r>
+              <a:rPr lang="en-US" sz="1400" b="1" dirty="0"/>
+              <a:t>Counter</a:t>
+            </a:r>
+            <a:r>
+              <a:rPr lang="en-US" sz="1400" dirty="0"/>
+              <a:t>, </a:t>
+            </a:r>
+            <a:r>
+              <a:rPr lang="en-US" sz="1400" b="1" dirty="0"/>
+              <a:t>Gauge</a:t>
+            </a:r>
+            <a:r>
+              <a:rPr lang="en-US" sz="1400" dirty="0"/>
+              <a:t>, </a:t>
+            </a:r>
+            <a:r>
+              <a:rPr lang="en-US" sz="1400" b="1" dirty="0" err="1"/>
+              <a:t>DistributionSummary</a:t>
+            </a:r>
+            <a:r>
+              <a:rPr lang="en-US" sz="1400" dirty="0"/>
+              <a:t>, </a:t>
+            </a:r>
+            <a:r>
+              <a:rPr lang="en-US" sz="1400" b="1" dirty="0" err="1"/>
+              <a:t>LongTaskTimer</a:t>
+            </a:r>
+            <a:r>
+              <a:rPr lang="en-US" sz="1400" dirty="0"/>
+              <a:t>, </a:t>
+            </a:r>
+            <a:r>
+              <a:rPr lang="en-US" sz="1400" b="1" dirty="0" err="1"/>
+              <a:t>FunctionCounter</a:t>
+            </a:r>
+            <a:r>
+              <a:rPr lang="en-US" sz="1400" dirty="0"/>
+              <a:t>, </a:t>
+            </a:r>
+            <a:r>
+              <a:rPr lang="en-US" sz="1400" b="1" dirty="0" err="1"/>
+              <a:t>FunctionTimer</a:t>
+            </a:r>
+            <a:r>
+              <a:rPr lang="en-US" sz="1400" dirty="0"/>
+              <a:t>, and </a:t>
+            </a:r>
+            <a:r>
+              <a:rPr lang="en-US" sz="1400" b="1" dirty="0" err="1"/>
+              <a:t>TimeGauge</a:t>
+            </a:r>
+            <a:r>
+              <a:rPr lang="en-US" sz="1400" dirty="0"/>
+              <a:t>. </a:t>
+            </a:r>
+            <a:br>
+              <a:rPr lang="en-US" sz="1400" dirty="0"/>
+            </a:br>
+            <a:br>
+              <a:rPr lang="en-US" sz="1400" dirty="0"/>
+            </a:br>
+            <a:endParaRPr lang="en-US" sz="1100" dirty="0"/>
           </a:p>
         </p:txBody>
       </p:sp>
@@ -10242,37 +10128,19 @@
               <a:buFont typeface="Arial"/>
               <a:buNone/>
             </a:pPr>
-            <a:endParaRPr lang="en-US" sz="1400" dirty="0" smtClean="0"/>
+            <a:endParaRPr lang="en-US" sz="1400" dirty="0"/>
           </a:p>
         </p:txBody>
       </p:sp>
       <p:pic>
         <p:nvPicPr>
-          <p:cNvPr id="4" name="Picture 3"/>
-          <p:cNvPicPr>
-            <a:picLocks noChangeAspect="1"/>
-          </p:cNvPicPr>
-          <p:nvPr/>
-        </p:nvPicPr>
-        <p:blipFill>
-          <a:blip r:embed="rId3"/>
-          <a:stretch>
-            <a:fillRect/>
-          </a:stretch>
-        </p:blipFill>
-        <p:spPr>
-          <a:xfrm>
-            <a:off x="6810780" y="941057"/>
-            <a:ext cx="2168641" cy="3603408"/>
-          </a:xfrm>
-          <a:prstGeom prst="rect">
-            <a:avLst/>
-          </a:prstGeom>
-        </p:spPr>
-      </p:pic>
-      <p:pic>
-        <p:nvPicPr>
-          <p:cNvPr id="5" name="Picture 4"/>
+          <p:cNvPr id="8" name="Picture 7">
+            <a:extLst>
+              <a:ext uri="{FF2B5EF4-FFF2-40B4-BE49-F238E27FC236}">
+                <a16:creationId xmlns:a16="http://schemas.microsoft.com/office/drawing/2014/main" id="{84B8CF42-FC66-7446-B6C2-4A10EEC64E7D}"/>
+              </a:ext>
+            </a:extLst>
+          </p:cNvPr>
           <p:cNvPicPr>
             <a:picLocks noChangeAspect="1"/>
           </p:cNvPicPr>
@@ -10286,8 +10154,38 @@
         </p:blipFill>
         <p:spPr>
           <a:xfrm>
-            <a:off x="1026037" y="2270852"/>
-            <a:ext cx="4304134" cy="2323753"/>
+            <a:off x="5498503" y="131019"/>
+            <a:ext cx="3511980" cy="4380020"/>
+          </a:xfrm>
+          <a:prstGeom prst="rect">
+            <a:avLst/>
+          </a:prstGeom>
+        </p:spPr>
+      </p:pic>
+      <p:pic>
+        <p:nvPicPr>
+          <p:cNvPr id="11" name="Picture 10">
+            <a:extLst>
+              <a:ext uri="{FF2B5EF4-FFF2-40B4-BE49-F238E27FC236}">
+                <a16:creationId xmlns:a16="http://schemas.microsoft.com/office/drawing/2014/main" id="{FE6B308F-149D-DA43-833A-A5116A1CB8A5}"/>
+              </a:ext>
+            </a:extLst>
+          </p:cNvPr>
+          <p:cNvPicPr>
+            <a:picLocks noChangeAspect="1"/>
+          </p:cNvPicPr>
+          <p:nvPr/>
+        </p:nvPicPr>
+        <p:blipFill>
+          <a:blip r:embed="rId5"/>
+          <a:stretch>
+            <a:fillRect/>
+          </a:stretch>
+        </p:blipFill>
+        <p:spPr>
+          <a:xfrm>
+            <a:off x="4852042" y="3284739"/>
+            <a:ext cx="4158442" cy="1239458"/>
           </a:xfrm>
           <a:prstGeom prst="rect">
             <a:avLst/>
@@ -10296,209 +10194,66 @@
       </p:pic>
       <p:sp>
         <p:nvSpPr>
-          <p:cNvPr id="9" name="Content Placeholder 2"/>
-          <p:cNvSpPr txBox="1">
-            <a:spLocks/>
-          </p:cNvSpPr>
+          <p:cNvPr id="12" name="TextBox 11">
+            <a:extLst>
+              <a:ext uri="{FF2B5EF4-FFF2-40B4-BE49-F238E27FC236}">
+                <a16:creationId xmlns:a16="http://schemas.microsoft.com/office/drawing/2014/main" id="{02681A45-BD1B-9744-B4D2-40C1F3D76280}"/>
+              </a:ext>
+            </a:extLst>
+          </p:cNvPr>
+          <p:cNvSpPr txBox="1"/>
           <p:nvPr/>
         </p:nvSpPr>
         <p:spPr>
           <a:xfrm>
-            <a:off x="123019" y="1864178"/>
-            <a:ext cx="6537380" cy="696955"/>
+            <a:off x="8194089" y="6649375"/>
+            <a:ext cx="184731" cy="369332"/>
+          </a:xfrm>
+          <a:prstGeom prst="rect">
+            <a:avLst/>
+          </a:prstGeom>
+          <a:noFill/>
+        </p:spPr>
+        <p:txBody>
+          <a:bodyPr wrap="none" rtlCol="0">
+            <a:spAutoFit/>
+          </a:bodyPr>
+          <a:lstStyle/>
+          <a:p>
+            <a:endParaRPr lang="en-US" dirty="0"/>
+          </a:p>
+        </p:txBody>
+      </p:sp>
+      <p:pic>
+        <p:nvPicPr>
+          <p:cNvPr id="14" name="Picture 13">
+            <a:extLst>
+              <a:ext uri="{FF2B5EF4-FFF2-40B4-BE49-F238E27FC236}">
+                <a16:creationId xmlns:a16="http://schemas.microsoft.com/office/drawing/2014/main" id="{0A43D3B8-DB9A-B645-88B1-59F11A789629}"/>
+              </a:ext>
+            </a:extLst>
+          </p:cNvPr>
+          <p:cNvPicPr>
+            <a:picLocks noChangeAspect="1"/>
+          </p:cNvPicPr>
+          <p:nvPr/>
+        </p:nvPicPr>
+        <p:blipFill>
+          <a:blip r:embed="rId6"/>
+          <a:stretch>
+            <a:fillRect/>
+          </a:stretch>
+        </p:blipFill>
+        <p:spPr>
+          <a:xfrm>
+            <a:off x="1016547" y="2765234"/>
+            <a:ext cx="3226106" cy="1660743"/>
           </a:xfrm>
           <a:prstGeom prst="rect">
             <a:avLst/>
           </a:prstGeom>
         </p:spPr>
-        <p:txBody>
-          <a:bodyPr>
-            <a:normAutofit/>
-          </a:bodyPr>
-          <a:lstStyle>
-            <a:lvl1pPr marL="342900" indent="-342900" algn="l" defTabSz="457200" rtl="0" eaLnBrk="1" latinLnBrk="0" hangingPunct="1">
-              <a:spcBef>
-                <a:spcPct val="20000"/>
-              </a:spcBef>
-              <a:buFont typeface="Arial"/>
-              <a:buChar char="•"/>
-              <a:defRPr sz="3200" kern="1200">
-                <a:solidFill>
-                  <a:schemeClr val="bg1"/>
-                </a:solidFill>
-                <a:latin typeface="Arial" panose="020B0604020202020204" pitchFamily="34" charset="0"/>
-                <a:ea typeface="+mn-ea"/>
-                <a:cs typeface="Arial" panose="020B0604020202020204" pitchFamily="34" charset="0"/>
-              </a:defRPr>
-            </a:lvl1pPr>
-            <a:lvl2pPr marL="742950" indent="-285750" algn="l" defTabSz="457200" rtl="0" eaLnBrk="1" latinLnBrk="0" hangingPunct="1">
-              <a:spcBef>
-                <a:spcPct val="20000"/>
-              </a:spcBef>
-              <a:buFont typeface="Arial"/>
-              <a:buChar char="–"/>
-              <a:defRPr sz="2800" kern="1200">
-                <a:solidFill>
-                  <a:schemeClr val="bg1"/>
-                </a:solidFill>
-                <a:latin typeface="Arial" panose="020B0604020202020204" pitchFamily="34" charset="0"/>
-                <a:ea typeface="+mn-ea"/>
-                <a:cs typeface="Arial" panose="020B0604020202020204" pitchFamily="34" charset="0"/>
-              </a:defRPr>
-            </a:lvl2pPr>
-            <a:lvl3pPr marL="1143000" indent="-228600" algn="l" defTabSz="457200" rtl="0" eaLnBrk="1" latinLnBrk="0" hangingPunct="1">
-              <a:spcBef>
-                <a:spcPct val="20000"/>
-              </a:spcBef>
-              <a:buFont typeface="Arial"/>
-              <a:buChar char="•"/>
-              <a:defRPr sz="2400" kern="1200">
-                <a:solidFill>
-                  <a:schemeClr val="bg1"/>
-                </a:solidFill>
-                <a:latin typeface="Arial" panose="020B0604020202020204" pitchFamily="34" charset="0"/>
-                <a:ea typeface="+mn-ea"/>
-                <a:cs typeface="Arial" panose="020B0604020202020204" pitchFamily="34" charset="0"/>
-              </a:defRPr>
-            </a:lvl3pPr>
-            <a:lvl4pPr marL="1600200" indent="-228600" algn="l" defTabSz="457200" rtl="0" eaLnBrk="1" latinLnBrk="0" hangingPunct="1">
-              <a:spcBef>
-                <a:spcPct val="20000"/>
-              </a:spcBef>
-              <a:buFont typeface="Arial"/>
-              <a:buChar char="–"/>
-              <a:defRPr sz="2000" kern="1200">
-                <a:solidFill>
-                  <a:schemeClr val="bg1"/>
-                </a:solidFill>
-                <a:latin typeface="Arial" panose="020B0604020202020204" pitchFamily="34" charset="0"/>
-                <a:ea typeface="+mn-ea"/>
-                <a:cs typeface="Arial" panose="020B0604020202020204" pitchFamily="34" charset="0"/>
-              </a:defRPr>
-            </a:lvl4pPr>
-            <a:lvl5pPr marL="2057400" indent="-228600" algn="l" defTabSz="457200" rtl="0" eaLnBrk="1" latinLnBrk="0" hangingPunct="1">
-              <a:spcBef>
-                <a:spcPct val="20000"/>
-              </a:spcBef>
-              <a:buFont typeface="Arial"/>
-              <a:buChar char="»"/>
-              <a:defRPr sz="2000" kern="1200">
-                <a:solidFill>
-                  <a:schemeClr val="bg1"/>
-                </a:solidFill>
-                <a:latin typeface="Arial" panose="020B0604020202020204" pitchFamily="34" charset="0"/>
-                <a:ea typeface="+mn-ea"/>
-                <a:cs typeface="Arial" panose="020B0604020202020204" pitchFamily="34" charset="0"/>
-              </a:defRPr>
-            </a:lvl5pPr>
-            <a:lvl6pPr marL="2514600" indent="-228600" algn="l" defTabSz="457200" rtl="0" eaLnBrk="1" latinLnBrk="0" hangingPunct="1">
-              <a:spcBef>
-                <a:spcPct val="20000"/>
-              </a:spcBef>
-              <a:buFont typeface="Arial"/>
-              <a:buChar char="•"/>
-              <a:defRPr sz="2000" kern="1200">
-                <a:solidFill>
-                  <a:schemeClr val="tx1"/>
-                </a:solidFill>
-                <a:latin typeface="+mn-lt"/>
-                <a:ea typeface="+mn-ea"/>
-                <a:cs typeface="+mn-cs"/>
-              </a:defRPr>
-            </a:lvl6pPr>
-            <a:lvl7pPr marL="2971800" indent="-228600" algn="l" defTabSz="457200" rtl="0" eaLnBrk="1" latinLnBrk="0" hangingPunct="1">
-              <a:spcBef>
-                <a:spcPct val="20000"/>
-              </a:spcBef>
-              <a:buFont typeface="Arial"/>
-              <a:buChar char="•"/>
-              <a:defRPr sz="2000" kern="1200">
-                <a:solidFill>
-                  <a:schemeClr val="tx1"/>
-                </a:solidFill>
-                <a:latin typeface="+mn-lt"/>
-                <a:ea typeface="+mn-ea"/>
-                <a:cs typeface="+mn-cs"/>
-              </a:defRPr>
-            </a:lvl7pPr>
-            <a:lvl8pPr marL="3429000" indent="-228600" algn="l" defTabSz="457200" rtl="0" eaLnBrk="1" latinLnBrk="0" hangingPunct="1">
-              <a:spcBef>
-                <a:spcPct val="20000"/>
-              </a:spcBef>
-              <a:buFont typeface="Arial"/>
-              <a:buChar char="•"/>
-              <a:defRPr sz="2000" kern="1200">
-                <a:solidFill>
-                  <a:schemeClr val="tx1"/>
-                </a:solidFill>
-                <a:latin typeface="+mn-lt"/>
-                <a:ea typeface="+mn-ea"/>
-                <a:cs typeface="+mn-cs"/>
-              </a:defRPr>
-            </a:lvl8pPr>
-            <a:lvl9pPr marL="3886200" indent="-228600" algn="l" defTabSz="457200" rtl="0" eaLnBrk="1" latinLnBrk="0" hangingPunct="1">
-              <a:spcBef>
-                <a:spcPct val="20000"/>
-              </a:spcBef>
-              <a:buFont typeface="Arial"/>
-              <a:buChar char="•"/>
-              <a:defRPr sz="2000" kern="1200">
-                <a:solidFill>
-                  <a:schemeClr val="tx1"/>
-                </a:solidFill>
-                <a:latin typeface="+mn-lt"/>
-                <a:ea typeface="+mn-ea"/>
-                <a:cs typeface="+mn-cs"/>
-              </a:defRPr>
-            </a:lvl9pPr>
-          </a:lstStyle>
-          <a:p>
-            <a:pPr marL="0" indent="0">
-              <a:buNone/>
-            </a:pPr>
-            <a:r>
-              <a:rPr lang="en-US" sz="1400" dirty="0">
-                <a:solidFill>
-                  <a:srgbClr val="FFFFFF"/>
-                </a:solidFill>
-              </a:rPr>
-              <a:t>Record your own metrics, inject </a:t>
-            </a:r>
-            <a:r>
-              <a:rPr lang="en-US" sz="1400" dirty="0" err="1">
-                <a:solidFill>
-                  <a:srgbClr val="FFFFFF"/>
-                </a:solidFill>
-              </a:rPr>
-              <a:t>CounterService</a:t>
-            </a:r>
-            <a:r>
-              <a:rPr lang="en-US" sz="1400" dirty="0">
-                <a:solidFill>
-                  <a:srgbClr val="FFFFFF"/>
-                </a:solidFill>
-              </a:rPr>
-              <a:t> and/or </a:t>
-            </a:r>
-            <a:r>
-              <a:rPr lang="en-US" sz="1400" dirty="0" err="1">
-                <a:solidFill>
-                  <a:srgbClr val="FFFFFF"/>
-                </a:solidFill>
-              </a:rPr>
-              <a:t>GaugeService</a:t>
-            </a:r>
-            <a:r>
-              <a:rPr lang="en-US" sz="1400" dirty="0">
-                <a:solidFill>
-                  <a:srgbClr val="FFFFFF"/>
-                </a:solidFill>
-              </a:rPr>
-              <a:t> into your bean</a:t>
-            </a:r>
-          </a:p>
-        </p:txBody>
-      </p:sp>
+      </p:pic>
     </p:spTree>
     <p:extLst>
       <p:ext uri="{BB962C8B-B14F-4D97-AF65-F5344CB8AC3E}">
@@ -10509,324 +10264,6 @@
   <p:clrMapOvr>
     <a:masterClrMapping/>
   </p:clrMapOvr>
-  <mc:AlternateContent xmlns:mc="http://schemas.openxmlformats.org/markup-compatibility/2006" xmlns:p14="http://schemas.microsoft.com/office/powerpoint/2010/main">
-    <mc:Choice Requires="p14">
-      <p:transition spd="slow" p14:dur="2000"/>
-    </mc:Choice>
-    <mc:Fallback xmlns="">
-      <p:transition xmlns:p14="http://schemas.microsoft.com/office/powerpoint/2010/main" spd="slow"/>
-    </mc:Fallback>
-  </mc:AlternateContent>
-  <p:timing>
-    <p:tnLst>
-      <p:par>
-        <p:cTn id="1" dur="indefinite" restart="never" nodeType="tmRoot">
-          <p:childTnLst>
-            <p:seq concurrent="1" nextAc="seek">
-              <p:cTn id="2" dur="indefinite" nodeType="mainSeq">
-                <p:childTnLst>
-                  <p:par>
-                    <p:cTn id="3" fill="hold">
-                      <p:stCondLst>
-                        <p:cond delay="indefinite"/>
-                      </p:stCondLst>
-                      <p:childTnLst>
-                        <p:par>
-                          <p:cTn id="4" fill="hold">
-                            <p:stCondLst>
-                              <p:cond delay="0"/>
-                            </p:stCondLst>
-                            <p:childTnLst>
-                              <p:par>
-                                <p:cTn id="5" presetID="1" presetClass="entr" presetSubtype="0" fill="hold" grpId="0" nodeType="clickEffect">
-                                  <p:stCondLst>
-                                    <p:cond delay="0"/>
-                                  </p:stCondLst>
-                                  <p:childTnLst>
-                                    <p:set>
-                                      <p:cBhvr>
-                                        <p:cTn id="6" dur="1" fill="hold">
-                                          <p:stCondLst>
-                                            <p:cond delay="0"/>
-                                          </p:stCondLst>
-                                        </p:cTn>
-                                        <p:tgtEl>
-                                          <p:spTgt spid="3">
-                                            <p:txEl>
-                                              <p:pRg st="0" end="0"/>
-                                            </p:txEl>
-                                          </p:spTgt>
-                                        </p:tgtEl>
-                                        <p:attrNameLst>
-                                          <p:attrName>style.visibility</p:attrName>
-                                        </p:attrNameLst>
-                                      </p:cBhvr>
-                                      <p:to>
-                                        <p:strVal val="visible"/>
-                                      </p:to>
-                                    </p:set>
-                                  </p:childTnLst>
-                                </p:cTn>
-                              </p:par>
-                            </p:childTnLst>
-                          </p:cTn>
-                        </p:par>
-                      </p:childTnLst>
-                    </p:cTn>
-                  </p:par>
-                  <p:par>
-                    <p:cTn id="7" fill="hold">
-                      <p:stCondLst>
-                        <p:cond delay="indefinite"/>
-                      </p:stCondLst>
-                      <p:childTnLst>
-                        <p:par>
-                          <p:cTn id="8" fill="hold">
-                            <p:stCondLst>
-                              <p:cond delay="0"/>
-                            </p:stCondLst>
-                            <p:childTnLst>
-                              <p:par>
-                                <p:cTn id="9" presetID="2" presetClass="entr" presetSubtype="2" fill="hold" nodeType="clickEffect">
-                                  <p:stCondLst>
-                                    <p:cond delay="0"/>
-                                  </p:stCondLst>
-                                  <p:childTnLst>
-                                    <p:set>
-                                      <p:cBhvr>
-                                        <p:cTn id="10" dur="1" fill="hold">
-                                          <p:stCondLst>
-                                            <p:cond delay="0"/>
-                                          </p:stCondLst>
-                                        </p:cTn>
-                                        <p:tgtEl>
-                                          <p:spTgt spid="4"/>
-                                        </p:tgtEl>
-                                        <p:attrNameLst>
-                                          <p:attrName>style.visibility</p:attrName>
-                                        </p:attrNameLst>
-                                      </p:cBhvr>
-                                      <p:to>
-                                        <p:strVal val="visible"/>
-                                      </p:to>
-                                    </p:set>
-                                    <p:anim calcmode="lin" valueType="num">
-                                      <p:cBhvr additive="base">
-                                        <p:cTn id="11" dur="500" fill="hold"/>
-                                        <p:tgtEl>
-                                          <p:spTgt spid="4"/>
-                                        </p:tgtEl>
-                                        <p:attrNameLst>
-                                          <p:attrName>ppt_x</p:attrName>
-                                        </p:attrNameLst>
-                                      </p:cBhvr>
-                                      <p:tavLst>
-                                        <p:tav tm="0">
-                                          <p:val>
-                                            <p:strVal val="1+#ppt_w/2"/>
-                                          </p:val>
-                                        </p:tav>
-                                        <p:tav tm="100000">
-                                          <p:val>
-                                            <p:strVal val="#ppt_x"/>
-                                          </p:val>
-                                        </p:tav>
-                                      </p:tavLst>
-                                    </p:anim>
-                                    <p:anim calcmode="lin" valueType="num">
-                                      <p:cBhvr additive="base">
-                                        <p:cTn id="12" dur="500" fill="hold"/>
-                                        <p:tgtEl>
-                                          <p:spTgt spid="4"/>
-                                        </p:tgtEl>
-                                        <p:attrNameLst>
-                                          <p:attrName>ppt_y</p:attrName>
-                                        </p:attrNameLst>
-                                      </p:cBhvr>
-                                      <p:tavLst>
-                                        <p:tav tm="0">
-                                          <p:val>
-                                            <p:strVal val="#ppt_y"/>
-                                          </p:val>
-                                        </p:tav>
-                                        <p:tav tm="100000">
-                                          <p:val>
-                                            <p:strVal val="#ppt_y"/>
-                                          </p:val>
-                                        </p:tav>
-                                      </p:tavLst>
-                                    </p:anim>
-                                  </p:childTnLst>
-                                </p:cTn>
-                              </p:par>
-                            </p:childTnLst>
-                          </p:cTn>
-                        </p:par>
-                      </p:childTnLst>
-                    </p:cTn>
-                  </p:par>
-                  <p:par>
-                    <p:cTn id="13" fill="hold">
-                      <p:stCondLst>
-                        <p:cond delay="indefinite"/>
-                      </p:stCondLst>
-                      <p:childTnLst>
-                        <p:par>
-                          <p:cTn id="14" fill="hold">
-                            <p:stCondLst>
-                              <p:cond delay="0"/>
-                            </p:stCondLst>
-                            <p:childTnLst>
-                              <p:par>
-                                <p:cTn id="15" presetID="1" presetClass="entr" presetSubtype="0" fill="hold" grpId="0" nodeType="clickEffect">
-                                  <p:stCondLst>
-                                    <p:cond delay="0"/>
-                                  </p:stCondLst>
-                                  <p:childTnLst>
-                                    <p:set>
-                                      <p:cBhvr>
-                                        <p:cTn id="16" dur="1" fill="hold">
-                                          <p:stCondLst>
-                                            <p:cond delay="0"/>
-                                          </p:stCondLst>
-                                        </p:cTn>
-                                        <p:tgtEl>
-                                          <p:spTgt spid="9"/>
-                                        </p:tgtEl>
-                                        <p:attrNameLst>
-                                          <p:attrName>style.visibility</p:attrName>
-                                        </p:attrNameLst>
-                                      </p:cBhvr>
-                                      <p:to>
-                                        <p:strVal val="visible"/>
-                                      </p:to>
-                                    </p:set>
-                                  </p:childTnLst>
-                                </p:cTn>
-                              </p:par>
-                            </p:childTnLst>
-                          </p:cTn>
-                        </p:par>
-                      </p:childTnLst>
-                    </p:cTn>
-                  </p:par>
-                  <p:par>
-                    <p:cTn id="17" fill="hold">
-                      <p:stCondLst>
-                        <p:cond delay="indefinite"/>
-                      </p:stCondLst>
-                      <p:childTnLst>
-                        <p:par>
-                          <p:cTn id="18" fill="hold">
-                            <p:stCondLst>
-                              <p:cond delay="0"/>
-                            </p:stCondLst>
-                            <p:childTnLst>
-                              <p:par>
-                                <p:cTn id="19" presetID="2" presetClass="entr" presetSubtype="8" fill="hold" nodeType="clickEffect">
-                                  <p:stCondLst>
-                                    <p:cond delay="0"/>
-                                  </p:stCondLst>
-                                  <p:childTnLst>
-                                    <p:set>
-                                      <p:cBhvr>
-                                        <p:cTn id="20" dur="1" fill="hold">
-                                          <p:stCondLst>
-                                            <p:cond delay="0"/>
-                                          </p:stCondLst>
-                                        </p:cTn>
-                                        <p:tgtEl>
-                                          <p:spTgt spid="5"/>
-                                        </p:tgtEl>
-                                        <p:attrNameLst>
-                                          <p:attrName>style.visibility</p:attrName>
-                                        </p:attrNameLst>
-                                      </p:cBhvr>
-                                      <p:to>
-                                        <p:strVal val="visible"/>
-                                      </p:to>
-                                    </p:set>
-                                    <p:anim calcmode="lin" valueType="num">
-                                      <p:cBhvr additive="base">
-                                        <p:cTn id="21" dur="500" fill="hold"/>
-                                        <p:tgtEl>
-                                          <p:spTgt spid="5"/>
-                                        </p:tgtEl>
-                                        <p:attrNameLst>
-                                          <p:attrName>ppt_x</p:attrName>
-                                        </p:attrNameLst>
-                                      </p:cBhvr>
-                                      <p:tavLst>
-                                        <p:tav tm="0">
-                                          <p:val>
-                                            <p:strVal val="0-#ppt_w/2"/>
-                                          </p:val>
-                                        </p:tav>
-                                        <p:tav tm="100000">
-                                          <p:val>
-                                            <p:strVal val="#ppt_x"/>
-                                          </p:val>
-                                        </p:tav>
-                                      </p:tavLst>
-                                    </p:anim>
-                                    <p:anim calcmode="lin" valueType="num">
-                                      <p:cBhvr additive="base">
-                                        <p:cTn id="22" dur="500" fill="hold"/>
-                                        <p:tgtEl>
-                                          <p:spTgt spid="5"/>
-                                        </p:tgtEl>
-                                        <p:attrNameLst>
-                                          <p:attrName>ppt_y</p:attrName>
-                                        </p:attrNameLst>
-                                      </p:cBhvr>
-                                      <p:tavLst>
-                                        <p:tav tm="0">
-                                          <p:val>
-                                            <p:strVal val="#ppt_y"/>
-                                          </p:val>
-                                        </p:tav>
-                                        <p:tav tm="100000">
-                                          <p:val>
-                                            <p:strVal val="#ppt_y"/>
-                                          </p:val>
-                                        </p:tav>
-                                      </p:tavLst>
-                                    </p:anim>
-                                  </p:childTnLst>
-                                </p:cTn>
-                              </p:par>
-                            </p:childTnLst>
-                          </p:cTn>
-                        </p:par>
-                      </p:childTnLst>
-                    </p:cTn>
-                  </p:par>
-                </p:childTnLst>
-              </p:cTn>
-              <p:prevCondLst>
-                <p:cond evt="onPrev" delay="0">
-                  <p:tgtEl>
-                    <p:sldTgt/>
-                  </p:tgtEl>
-                </p:cond>
-              </p:prevCondLst>
-              <p:nextCondLst>
-                <p:cond evt="onNext" delay="0">
-                  <p:tgtEl>
-                    <p:sldTgt/>
-                  </p:tgtEl>
-                </p:cond>
-              </p:nextCondLst>
-            </p:seq>
-          </p:childTnLst>
-        </p:cTn>
-      </p:par>
-    </p:tnLst>
-    <p:bldLst>
-      <p:bldP spid="3" grpId="0" build="p"/>
-      <p:bldP spid="9" grpId="0"/>
-    </p:bldLst>
-  </p:timing>
 </p:sld>
 </file>
 
@@ -10863,7 +10300,7 @@
           <a:lstStyle/>
           <a:p>
             <a:r>
-              <a:rPr lang="en-US" dirty="0" smtClean="0"/>
+              <a:rPr lang="en-US" dirty="0"/>
               <a:t>Profiles</a:t>
             </a:r>
             <a:endParaRPr lang="en-US" dirty="0">
@@ -10910,12 +10347,6 @@
               </a:rPr>
               <a:t>YAML file can contain for several documents </a:t>
             </a:r>
-            <a:endParaRPr lang="en-US" sz="1400" dirty="0" smtClean="0">
-              <a:solidFill>
-                <a:srgbClr val="EEECE1"/>
-              </a:solidFill>
-              <a:sym typeface="Arial"/>
-            </a:endParaRPr>
           </a:p>
           <a:p>
             <a:pPr>
@@ -10958,12 +10389,6 @@
               </a:rPr>
               <a:t>Convenient to specify alternate configurations in the same file </a:t>
             </a:r>
-            <a:endParaRPr lang="en-US" sz="1400" dirty="0" smtClean="0">
-              <a:solidFill>
-                <a:srgbClr val="EEECE1"/>
-              </a:solidFill>
-              <a:sym typeface="Arial"/>
-            </a:endParaRPr>
           </a:p>
           <a:p>
             <a:pPr>
@@ -10971,7 +10396,7 @@
                 <a:srgbClr val="008774"/>
               </a:buClr>
             </a:pPr>
-            <a:endParaRPr lang="en-US" sz="1400" dirty="0" smtClean="0">
+            <a:endParaRPr lang="en-US" sz="1400" dirty="0">
               <a:solidFill>
                 <a:srgbClr val="EEECE1"/>
               </a:solidFill>
@@ -10985,7 +10410,7 @@
               </a:buClr>
             </a:pPr>
             <a:r>
-              <a:rPr lang="en-US" sz="1400" dirty="0" smtClean="0">
+              <a:rPr lang="en-US" sz="1400" dirty="0">
                 <a:solidFill>
                   <a:srgbClr val="EEECE1"/>
                 </a:solidFill>
@@ -10993,12 +10418,6 @@
               </a:rPr>
               <a:t>Set the active profile</a:t>
             </a:r>
-            <a:endParaRPr lang="en-US" sz="1400" dirty="0">
-              <a:solidFill>
-                <a:srgbClr val="EEECE1"/>
-              </a:solidFill>
-              <a:sym typeface="Arial"/>
-            </a:endParaRPr>
           </a:p>
           <a:p>
             <a:pPr marL="0" indent="0">
@@ -11007,7 +10426,7 @@
               </a:buClr>
               <a:buNone/>
             </a:pPr>
-            <a:endParaRPr lang="en-US" sz="1050" dirty="0" smtClean="0">
+            <a:endParaRPr lang="en-US" sz="1050" dirty="0">
               <a:solidFill>
                 <a:srgbClr val="EEECE1"/>
               </a:solidFill>
@@ -11022,31 +10441,13 @@
               <a:buNone/>
             </a:pPr>
             <a:r>
-              <a:rPr lang="en-US" sz="1200" dirty="0" smtClean="0">
+              <a:rPr lang="en-US" sz="1200" dirty="0">
                 <a:solidFill>
                   <a:srgbClr val="EEECE1"/>
                 </a:solidFill>
                 <a:sym typeface="Arial"/>
               </a:rPr>
-              <a:t>SPRING_PROFILES_ACTIVE</a:t>
-            </a:r>
-            <a:r>
-              <a:rPr lang="en-US" sz="1200" dirty="0">
-                <a:solidFill>
-                  <a:srgbClr val="EEECE1"/>
-                </a:solidFill>
-                <a:sym typeface="Arial"/>
-              </a:rPr>
-              <a:t>=</a:t>
-            </a:r>
-            <a:r>
-              <a:rPr lang="en-US" sz="1200" dirty="0" smtClean="0">
-                <a:solidFill>
-                  <a:srgbClr val="EEECE1"/>
-                </a:solidFill>
-                <a:sym typeface="Arial"/>
-              </a:rPr>
-              <a:t>production</a:t>
+              <a:t>SPRING_PROFILES_ACTIVE=production</a:t>
             </a:r>
           </a:p>
           <a:p>
@@ -11077,16 +10478,7 @@
                 </a:solidFill>
                 <a:sym typeface="Arial"/>
               </a:rPr>
-              <a:t> </a:t>
-            </a:r>
-            <a:r>
-              <a:rPr lang="en-US" sz="1200" dirty="0" smtClean="0">
-                <a:solidFill>
-                  <a:srgbClr val="EEECE1"/>
-                </a:solidFill>
-                <a:sym typeface="Arial"/>
-              </a:rPr>
-              <a:t>    or</a:t>
+              <a:t>     or</a:t>
             </a:r>
           </a:p>
           <a:p>
@@ -11096,7 +10488,7 @@
               </a:buClr>
               <a:buNone/>
             </a:pPr>
-            <a:endParaRPr lang="en-US" sz="1200" dirty="0" smtClean="0">
+            <a:endParaRPr lang="en-US" sz="1200" dirty="0">
               <a:solidFill>
                 <a:srgbClr val="EEECE1"/>
               </a:solidFill>
@@ -11321,7 +10713,7 @@
               <a:buFont typeface="Arial"/>
               <a:buNone/>
             </a:pPr>
-            <a:endParaRPr lang="en-US" sz="1400" dirty="0" smtClean="0"/>
+            <a:endParaRPr lang="en-US" sz="1400" dirty="0"/>
           </a:p>
         </p:txBody>
       </p:sp>
@@ -11590,7 +10982,7 @@
               <a:buNone/>
             </a:pPr>
             <a:r>
-              <a:rPr lang="en-US" sz="1400" dirty="0" smtClean="0"/>
+              <a:rPr lang="en-US" sz="1400" dirty="0"/>
               <a:t>Development profile</a:t>
             </a:r>
           </a:p>
@@ -11763,7 +11155,7 @@
               <a:buNone/>
             </a:pPr>
             <a:r>
-              <a:rPr lang="en-US" sz="1400" dirty="0" smtClean="0"/>
+              <a:rPr lang="en-US" sz="1400" dirty="0"/>
               <a:t>Production profile</a:t>
             </a:r>
           </a:p>
@@ -11827,21 +11219,6 @@
   <p:clrMapOvr>
     <a:masterClrMapping/>
   </p:clrMapOvr>
-  <mc:AlternateContent xmlns:mc="http://schemas.openxmlformats.org/markup-compatibility/2006" xmlns:p14="http://schemas.microsoft.com/office/powerpoint/2010/main">
-    <mc:Choice Requires="p14">
-      <p:transition spd="slow" p14:dur="2000"/>
-    </mc:Choice>
-    <mc:Fallback xmlns="">
-      <p:transition xmlns:p14="http://schemas.microsoft.com/office/powerpoint/2010/main" spd="slow"/>
-    </mc:Fallback>
-  </mc:AlternateContent>
-  <p:timing>
-    <p:tnLst>
-      <p:par>
-        <p:cTn id="1" dur="indefinite" restart="never" nodeType="tmRoot"/>
-      </p:par>
-    </p:tnLst>
-  </p:timing>
 </p:sld>
 </file>
 
@@ -12190,7 +11567,7 @@
               <a:buSzPct val="25000"/>
             </a:pPr>
             <a:r>
-              <a:rPr lang="en-US" cap="all" dirty="0" smtClean="0">
+              <a:rPr lang="en-US" cap="all" dirty="0">
                 <a:solidFill>
                   <a:srgbClr val="74CEC7"/>
                 </a:solidFill>
@@ -12215,21 +11592,6 @@
   <p:clrMapOvr>
     <a:masterClrMapping/>
   </p:clrMapOvr>
-  <mc:AlternateContent xmlns:mc="http://schemas.openxmlformats.org/markup-compatibility/2006" xmlns:p14="http://schemas.microsoft.com/office/powerpoint/2010/main">
-    <mc:Choice Requires="p14">
-      <p:transition p14:dur="0"/>
-    </mc:Choice>
-    <mc:Fallback xmlns="">
-      <p:transition xmlns:p14="http://schemas.microsoft.com/office/powerpoint/2010/main"/>
-    </mc:Fallback>
-  </mc:AlternateContent>
-  <p:timing>
-    <p:tnLst>
-      <p:par>
-        <p:cTn id="1" dur="indefinite" restart="never" nodeType="tmRoot"/>
-      </p:par>
-    </p:tnLst>
-  </p:timing>
 </p:sld>
 </file>
 

</xml_diff>